<commit_message>
pres + small bootsrap edit
</commit_message>
<xml_diff>
--- a/presentation.pptx
+++ b/presentation.pptx
@@ -21,7 +21,6 @@
     <p:sldId id="263" r:id="rId15"/>
     <p:sldId id="274" r:id="rId16"/>
     <p:sldId id="262" r:id="rId17"/>
-    <p:sldId id="272" r:id="rId18"/>
   </p:sldIdLst>
   <p:sldSz cx="12192000" cy="6858000"/>
   <p:notesSz cx="6858000" cy="9144000"/>
@@ -121,6 +120,103 @@
     </a:lvl9pPr>
   </p:defaultTextStyle>
 </p:presentation>
+</file>
+
+<file path=ppt/ink/ink1.xml><?xml version="1.0" encoding="utf-8"?>
+<inkml:ink xmlns:inkml="http://www.w3.org/2003/InkML">
+  <inkml:definitions>
+    <inkml:context xml:id="ctx0">
+      <inkml:inkSource xml:id="inkSrc0">
+        <inkml:traceFormat>
+          <inkml:channel name="X" type="integer" min="-2.14748E9" max="2.14748E9" units="cm"/>
+          <inkml:channel name="Y" type="integer" min="-2.14748E9" max="2.14748E9" units="cm"/>
+          <inkml:channel name="F" type="integer" max="32767" units="dev"/>
+        </inkml:traceFormat>
+        <inkml:channelProperties>
+          <inkml:channelProperty channel="X" name="resolution" value="1000" units="1/cm"/>
+          <inkml:channelProperty channel="Y" name="resolution" value="1000" units="1/cm"/>
+          <inkml:channelProperty channel="F" name="resolution" value="0" units="1/dev"/>
+        </inkml:channelProperties>
+      </inkml:inkSource>
+      <inkml:timestamp xml:id="ts0" timeString="2018-04-17T06:32:35.906"/>
+    </inkml:context>
+    <inkml:brush xml:id="br0">
+      <inkml:brushProperty name="width" value="0.05" units="cm"/>
+      <inkml:brushProperty name="height" value="0.05" units="cm"/>
+      <inkml:brushProperty name="color" value="#E71224"/>
+    </inkml:brush>
+  </inkml:definitions>
+  <inkml:trace contextRef="#ctx0" brushRef="#br0">538 77 4612,'0'0'780,"0"0"-42,0 0-42,0-1-39,-1 1-39,1 0-36,0 0-37,0-1-34,0 0 413,0 0-123,0 0-111,0 0-101,0-1-37,0 1-99,-1-1-84,1 0-69,0 1-59,0-1-39,-1-3 359,0 2-281,0 2 87,1 0-140,0 0 36,-1 0 103,1 1 67,0-1 74,-1 1 84,-14-9 793,2 0-95,2 2-256,0 0-114,4 5-509,0 0-37,0 1-38,-2 0-40,5 1-84,-6 0 244,0 0-46,0 0-44,1 0-39,0 1-37,0-1-34,-8 1 169,2 1-124,0 0-59,-34 13 375,27-4-317,-71 48 796,68-41-761,3 1-57,0 4-1,-9 21 64,11-7-130,11-21 10,2 2 0,0-1-1,-4 17-219,4-6 161,2 2-59,-1 23 12,0 79 286,8-92-316,2-2-52,0-15-32,1 1 0,2-1 0,0 0 0,1-1 0,2 0 0,7 14 0,-2-10 0,0-1 0,1 0 0,2-2 0,0 0 0,2-1 0,0-1 0,3 1 0,3 1 0,1 0 0,15 8 0,-32-24 0,1-1 0,0 0 0,0-1 0,0 0 0,1 0 0,0-1 0,0-1 0,8 1 0,22 3 0,1-3 0,40-1 0,-70-4 0,-1 0 0,0-1 0,0 0 0,0-1 0,0 0 0,0-1 0,-1 0 0,1-1 0,-1 0 0,0-1 0,0-1 0,26-16 0,-2-2 0,16-16 0,-44 36 0,5-7 0,0 1 0,-1-2 0,0 0 0,-1 0 0,0-1 0,-1 0 0,0 0 0,-2-1 0,0 0 0,0-1 0,-1 1 0,-1-1 0,-1-1 0,0 1 0,0-8 0,3-25 0,-3-1 0,-2 1 0,-1-1 0,-6-28 0,4 66-6,0-1 0,-1 1 0,-1 0 0,0 0 0,-3-6 6,1 5-23,0 1 0,-1 0 1,-1 0-1,-6-8 23,3 6-49,0 0-1,-1 2 1,-9-9 49,-43-30-205,-8 7-54,-5 7-53,1 7-51,4 6-49,59 21 31,0-1-39,0 2-48,0-1-59,0 1-66,0-1-76,0 2-84,0-1-95,4 1 227,0 0-49,0 0-51,0 0-54,0 1-56,0-1-60,0 1-61,1-1-64,-3 1-382,2-1-95,-3 1-391,-4 0-1045</inkml:trace>
+  <inkml:trace contextRef="#ctx0" brushRef="#br0" timeOffset="2017.3669">4655 36 4164,'0'0'1067,"0"0"-51,0 0-49,0-1-47,0 1-46,0 0-44,0-1-43,0 0-42,0 1-40,-1-1-38,1 0-38,0 0-35,0-1 493,0 0-125,0 1-439,0 0-39,-1-1-35,1 1-33,0-2 326,-1 1-100,1 0-135,-1 0-51,-2-3 1439,-5 3-1042,-1 0-76,1 1-72,-1 0-68,0 1-65,0 0-61,1 0-57,-1 1-54,1 0-49,-1 1-47,1 1-42,0 0-39,-7 6 123,2 2-111,-16 20 166,-1 0 52,-55 60 964,52-50-848,7-5-151,4 2-75,3 2-98,4 3-119,-15 83-81,25-97-47,1 1 1,2 0-1,1 0 1,1 0-1,3 16 2,0-30 0,1 0 0,0 0 0,1-1 0,1 1 0,0-1 0,1 0 0,1-1 0,5 7 0,19 29 0,26 28 0,-54-72 0,14 14 0,1 0 0,1-1 0,1-1 0,10 6 0,-5-3 0,-11-11 0,1-2 0,0 1 0,0-2 0,0 0 0,1-1 0,0 0 0,11 1 0,-5 0 0,118 22 0,-92-21 0,1-1 0,1-3 0,-1-2 0,17-3 0,-65 1 0,19 0 0,1 0 0,-1-2 0,0-1 0,0-1 0,0 0 0,0-2 0,-1 0 0,0-1 0,0-2 0,0 0 0,-1 0 0,-1-2 0,0-1 0,0 0 0,-1-1 0,-1-1 0,5-5 0,0-1 0,-1-2 0,-1 0 0,0-2 0,-2 0 0,-1 0 0,-7 9 0,-1-1 0,-1 1 0,0-1 0,-1 0 0,0-1 0,-2 0 0,0 1 0,-1-1 0,0-7 0,0-2 0,-2 1 0,-1-1 0,-1 1 0,-4-23 0,2 34 0,0 0 0,-1 0 0,0 0 0,-1 0 0,-1 1 0,0-1 0,-1 1 0,0 1 0,-4-5 0,-3-1 0,0 1 0,-1 1 0,-1 0 0,-1 1 0,0 1 0,-1 0 0,0 1 0,-1 1 0,-15-6 0,-35-16 0,-2 3 0,-15-1 0,17 5 0,56 22-20,0 0-38,-1 1-37,1-1-36,0 1-35,0-1-32,-14-3-291,1 0-115,-1 0-102,0 0-91,0 0-81,2 1-13,-1 0-52,-12-5-546,0 0-63,33 11 827,0-1-36,-5-1-851,-2-1-444,-7-2-1165</inkml:trace>
+  <inkml:trace contextRef="#ctx0" brushRef="#br0" timeOffset="5369.2844">768 1034 6150,'2'0'1540,"1"0"-390,-1 0-39,0 0-38,0 0-37,1 1-37,-1-1-36,0 0-34,0 1-36,0-1-34,0 1-33,0-1-33,2 1 696,1 1-124,-1-1-120,0 1-114,0 0-110,0 0-105,0 0-100,-1 0-95,1 0-91,0 1-85,-1-1-167,0 0-50,0 0-46,0 0-44,0 0-42,0 1-38,0-1-38,0 0-34,1 1-24,-1 0-41,4 3-87,-3-2-30,0 0-33,1 0-60,3 3-137,5 5-261,-4-4 298,-6-5 214,1 0 35,0 0 39,0 1 46,-1-2 30,0 0 39,0 1 42,0-1 43,0 0 49,1 1 50,-1-1 54,0 0 56,44 27-167,25 21 296,-42-27-331,1 2-56,0 0-93,-5-4-44,1-2 0,18 10-13,-5-6 54,1-3 0,39 14-54,36 6 186,55 8-186,-133-38 11,25 11 11,-43-14-13,1 0-1,0-1 1,8 1-9,241 40 15,334 50 58,-402-73-51,1-9 1,2-9-23,575 5 46,332-3 42,-371-50-15,-494 21-90,-1-2-38,-142 14 16,530-81-40,-401 52 62,-52 7-36,93-19-151,-22 3 15,-86 18 128,206-29-47,189-14-152,-344 54 116,1 3 43,-6 0 62,-2-3 82,344-38-176,-417 41-385,-43 0 236,-18 0 146,-39 5 115,-1 0 38,-29 8-186,-1 1 52,1-1 46,-1 1 41,5-1 54,0 1 72,27 0 379,-22 1-363,-7 0-112,-1 1-53,1-1-61,0 0-72,-1 1-40,-1-1-67,1 0-73,1 1-80,-1-1-86,0 0-93,1 0-98,-1 0-106,-8 0 100,0 0 64,0 0 58,0 0 56,0 0 53,0 0 48,0-1 45,0 1 41,0 0-83,0-1 64,0 1 54,0-1 44,0 0-37,1-1-458,-1 2 413,0-1-24,0 1-87,0-1 195,0 1-33,0 0-37,0 0-39,1-1-499,-1 1-52,0-1-45,1 0-41,0 1-250,-1-1-40,1 0-302,1 0-853</inkml:trace>
+  <inkml:trace contextRef="#ctx0" brushRef="#br0" timeOffset="7387.8398">5325 1156 224,'0'0'249,"0"0"196,0 0-36,0 0-204,0 0 234,0 0 104,0 0 175,0 0-288,0 0-95,0 0 40,0 0 164,0 0-321,0 0-16,0 0 28,0 0 76,0 0-20,0 0 41,0 0 1371,0 0-1167,0 0-71,0 0-60,0 0-50,0 0 19,0 0 425,0 0-293,0 0 306,0 0-7,0 0-308,0 0 53,0 0-59,0 0 654,0 0-122,1 0-113,0 0-107,0 0-100,0 0-90,1 0-85,-1 1-77,1-1-1,0 0-87,0 1-74,0-1-61,1 1 67,2 1 205,7 14 147,0 0-65,1-1-57,-1 1-52,1 0-47,0 0-39,14 16 283,-2-3-124,11 16 203,-8-9-346,-2 2-101,-1-4-90,35 42 199,-38-51-277,2 3 49,4-7 38,25 20-40,-40-31-140,4 2 37,-7-9 53,-9-3-62,32 12 92,-21-9-125,48 17-26,-58-20 16,6 0 14,-8 0-26,9 0-37,-8 0 66,-1 0-47,0 0-52,0 0-81,0 0 28,0 0-35,0 0-43,0 0-63,0 0-87,0 0-108,0 0 177,0 0-37,0 0-39,0 0-43,-1 0-47,1 0-49,-1 0-53,0 0-57,-1-1-341,-1 1-98,1 0 225,0-1-33,-5 0-1805</inkml:trace>
+  <inkml:trace contextRef="#ctx0" brushRef="#br0" timeOffset="14609.8993">11262 1054 2851,'1'1'192,"0"1"43,0-1 40,1 1 37,0 2 410,1 1 108,-1-2-87,1 1 41,5 8 1884,-4-9-1564,1 0-60,-3-3-566,0 1-37,-2-1-757,1 0 67,-1 0 65,0 0 62,0 0 58,1 0 56,-1 0 52,0 1 50,1-1 79,-1 0 62,0 1 56,1-1 52,-1 0 256,1 1 85,-1-1 69,1 1 51,0 0 1944,-1-1-1612,0 0-543,0-1-37,0 1-45,-1 0-53,1 0-123,0-1-48,-1 1-52,1-1-57,-1 0-61,1 1-67,-1-1-71,0 0-75,-7-8 352,-1 0 1,-1 1 0,1 1-1,-6-4-256,-7-3 303,2 0-48,7 6-120,-26-16 1267,-41-19-1402,38 23 435,0 1-48,0 0-66,1-1-85,0-1-101,1-1-120,17 10 44,17 10-68,0 1-40,0 1-59,5 0 0,1 0-49,-1 0-61,1 0-73,0 0-484,0 0 81,0 0 72,0 0 63,-1 0 133,1 0 34,-1 0-309,1 0 88,-2 0-738,2 0 905,-1 0-40,1 0-63,0 0-71,-1 0-82,1 0-99,0 0-402,0 0-69,0 0-320,0 0-870</inkml:trace>
+  <inkml:trace contextRef="#ctx0" brushRef="#br0" timeOffset="15397.9958">11255 1069 2466,'0'0'1049,"0"0"-432,0 0-46,0 0-299,0 0 89,0 0 90,0 0-40,0 0 51,0 0 1911,0 0-1632,0 0-92,0 0-78,0 0-61,0 0-47,0 0-38,0 0 347,0 0-63,0 0-72,0 0 157,0 0-425,0 0 201,0 0 382,0 0-12,0 0-391,0 0 40,0 1-100,0 0-86,1 1-73,-1 0-30,0 1-55,-1 6 409,1-5-324,0-2-86,-1 0 48,-2 13 482,-1-1-66,-1 1-62,1-1-59,0 1-57,-1-1-54,0 0-51,0 1-48,0-1-46,0 0-42,-1 1-41,1-1-36,-6 14 110,0 1-116,-1 1-88,0 1-79,-23 69-132,22-56 117,11-40-245,1 1 55,-5 11-209,4-9 181,0-2 38,0-1-44,1 0-74,-1 1-74,-1-1-88,1 1-100,1-3 190,0 1-37,0-1-40,-1 0-41,1 1-45,0-1-45,0 0-48,-1 1-51,1-1-53,-1 0-54,1 0-58,0 1-59,-1-1-61,1 0-65,-1 0-65,1 0-68,0-1 169,0 0-56,0 1-49,0-1-43,0 0-271,0 1-44,-1-1-326,0 2-925</inkml:trace>
+</inkml:ink>
+</file>
+
+<file path=ppt/ink/ink2.xml><?xml version="1.0" encoding="utf-8"?>
+<inkml:ink xmlns:inkml="http://www.w3.org/2003/InkML">
+  <inkml:definitions>
+    <inkml:context xml:id="ctx0">
+      <inkml:inkSource xml:id="inkSrc0">
+        <inkml:traceFormat>
+          <inkml:channel name="X" type="integer" min="-2.14748E9" max="2.14748E9" units="cm"/>
+          <inkml:channel name="Y" type="integer" min="-2.14748E9" max="2.14748E9" units="cm"/>
+          <inkml:channel name="F" type="integer" max="32767" units="dev"/>
+        </inkml:traceFormat>
+        <inkml:channelProperties>
+          <inkml:channelProperty channel="X" name="resolution" value="1000" units="1/cm"/>
+          <inkml:channelProperty channel="Y" name="resolution" value="1000" units="1/cm"/>
+          <inkml:channelProperty channel="F" name="resolution" value="0" units="1/dev"/>
+        </inkml:channelProperties>
+      </inkml:inkSource>
+      <inkml:timestamp xml:id="ts0" timeString="2018-04-17T06:32:13.582"/>
+    </inkml:context>
+    <inkml:brush xml:id="br0">
+      <inkml:brushProperty name="width" value="0.05" units="cm"/>
+      <inkml:brushProperty name="height" value="0.05" units="cm"/>
+      <inkml:brushProperty name="color" value="#E71224"/>
+    </inkml:brush>
+  </inkml:definitions>
+  <inkml:trace contextRef="#ctx0" brushRef="#br0">560 1090 7079,'-3'-7'1336,"0"1"-85,-1 1-83,0-1-79,-1 1-73,0 1-71,0-1-67,0 1-62,-1 1-59,1-1-54,-1 1-51,0 0-47,-1 0-42,1 1-39,-7-2 424,1 1-237,0 1-56,-26-3 1315,22 4-1088,1 1 117,7 0-444,1-1 46,0 2-182,-1 1-34,-6 3 292,-1 4-112,1 3-96,0 1-81,1 0-65,0 2-51,1-2-33,-6 8 139,4-5-88,-1 1-48,0 0-41,1 0-37,-13 17 71,8-7-6,0 1 0,-7 17-229,4 1 268,4-6-240,10-23-21,0-1 0,2 2 0,-1-1 0,2 1 0,0 0 0,2 0 0,0 0 0,0 0 0,2 5-7,0 10 0,0-14 0,1 0 0,1 1 0,0-1 0,1 0 0,1 0 0,1 0 0,5 13 0,15 43 0,-18-51 0,2-1 0,1 1 0,5 8 0,17 47 0,-23-55 0,1-1 0,11 19 0,-10-24 0,11 21 0,2-2 0,8 10 0,-20-33 0,0-1 0,1 0 0,1-1 0,-1 0 0,2-1 0,0 0 0,7 3 0,-6-5 0,0 0 0,0-1 0,0-1 0,1 0 0,0-1 0,1-1 0,-1-1 0,1 0 0,0-1 0,0-1 0,0 0 0,0-2 0,2 0 0,-2 1 0,0-1 0,0-1 0,0-1 0,0 0 0,0-1 0,-1-1 0,1-1 0,-1 0 0,0-1 0,-1-1 0,1 0 0,-1-1 0,-1-1 0,0 0 0,0-1 0,0 0 0,8-10 0,1-2 0,0-1 0,-2-1 0,0 0 0,-2-2 0,-1 0 0,-1-2 0,-1 0 0,-1 0 0,-2-1 0,-1-1 0,-1 0 0,3-18 0,-5 8 0,-2-1 0,-1-1 0,0-38 0,-6 60 0,-1 1 0,0 0 0,-1 0 0,-2 0 0,1 0 0,-2 0 0,-1 1 0,0 0 0,-7-12 0,-7-15 0,15 31 0,-1 0 0,0 1 0,-1 0 0,0 1 0,-1-1 0,-1 1 0,0 1 0,0 0 0,-6-5 0,-16-10 3,0 1-1,-2 2 1,0 1 0,-2 2-1,-10-4-2,-70-27-13,-6 4-40,110 43 34,-1 0-44,1 0-47,0-1-50,-1 1-54,1-1-56,0 1-61,0-1-62,-1 0-66,1 0-70,0 1-72,0-1-76,1 0-78,-1 0-83,1 0-84,-1 0-88,7 2 417,-1 1-33,-4-3-713,-1 0-384,-5-3-997,14 7 2583</inkml:trace>
+  <inkml:trace contextRef="#ctx0" brushRef="#br0" timeOffset="48000.0385">993 1354 224,'0'0'534,"0"0"-341,0 0-60,0 0 5,0 0-20,0 0-6,0 0 32,0 0 0,0 0 65,0 0 132,0 0 92,0 0-12,0 0-95,0 0 5,0 0-27,0 0-5,0 0-43,0 0 70,0 0-168,0 0-8,0 0 19,0 0 53,0 0 220,0 0 761,0 0-637,0 0 133,0 0 417,0 0-43,0 0 122,0 0-773,0 0 149,0 0 342,0 0-80,0 0-70,0 0 27,0 0 6,0 0 21,0 0 138,0 0-53,0 0 22,0 0 10,0 0-58,0 0-409,0 0 48,0 0 633,0 0-601,0 0-48,0 0-154,0-1-41,0 1-36,0 0-36,0-2 139,0 0-107,0 0-89,0 0-61,0-6 67,0 5-67,0 1-21,0 1 35,0 0 40,0 0 48,1-8 363,1-1-63,3 0-56,0 0-50,2 0-44,0 0-36,7-10 246,9-12 282,16-19-800,28-18-68,-65 67 10,56-48 0,1 4 0,3 2 0,1 2 0,23-8 0,78-51 0,-80 48 0,3 3 0,2 5 0,4 3 0,282-107 0,-119 61 0,4 11 0,63-2 0,-226 61-51,3 3 51,197-12-183,-56 6 54,-46 0-71,1 2 40,256-13-372,16 19 532,-254 12-85,106-5 118,-37 2-8,-94 2-94,-32 2-80,1 2-113,-7 4 130,1 2 35,152 15 3,-62-5 102,356 36-37,-398-29-22,-3 3-55,31 9 93,143 31-95,-212-36 90,154 36 87,-4 16-64,-184-44-21,-2 6 0,-2 5 0,101 60 16,-182-89-17,73 41 13,-73-43 25,1-1 1,1-2-1,14 3-21,-47-19 37,-7-1 65,-2 0 63,0 0-42,0 0-59,0 0-393,0 0 62,0 0 61,1 0 54,-1 0 52,0 0 47,0 0 43,0 0 38,0 0 126,1 0 102,-1 0 114,2 0 599,-2 0-666,1 0-113,-1 0-49,1 0-59,-1 0-71,1 0-106,-1 0-3,0 0-35,0 0-39,0 0-41,1 0-44,-1 0-45,0 0-76,0 0-57,1 0-62,-1 0-64,0 0-67,0 0-70,0 0-73,0 0-75,1 0-79,-1 0-82,0 0-84,0 0-88,0 0-90,0 0-93,0 0-97,0 0-99,0 0 681,0 0-53,0 0-48,0 0-41,0 0-249,0 0-42,0 0-300,0 0-850</inkml:trace>
+  <inkml:trace contextRef="#ctx0" brushRef="#br0" timeOffset="49081.917">10711 855 4612,'0'0'730,"0"0"-301,0 0-81,0 0-59,0 0 34,0 0 110,0 0 134,0 0 114,0 0 248,0 0 588,0 0-584,0 0-52,0 0-49,0 0-49,0-1-46,0 1-46,0 0-44,0-1-41,0 1-42,0-1-40,0 1-38,0-1-36,0 0-35,0 1-35,0-2 286,0 1-270,0 0-54,0 0-51,0 0-44,0 0-43,0-1-38,0 0 69,0 0-140,0 0-35,0 0-24,0-6 19,0 7 5,0-1 48,0 0 41,0 1 61,0 0 73,0 0 83,0-5 60,-1 0-35,-1-7 290,0 0-119,-2 0-106,-2-4-25,0 1-104,-2-4-33,-5-8 38,4 8-83,4 7-47,-4-7 16,1 1-60,-3-5-28,-5-11-6,-7-13 46,9 15 40,2 6 78,7 13-93,0 0 41,4 8-29,1 0-69,-1-2 62,-4 7-8,4 1-123,1 0-15,0 0 31,0 0 1,0 0-38,0 0-6,0-2-334,0-1-78,0 2 57,0-1-70,0 1 1,0 0-66,0 0-74,0 0-82,0 0 31,0 0-67,0 0-72,0 0-77,0 0-81,0 0-87,0 0-91,0 0-96,0 1 423,0 0-36,0 0-846,0 0-440,0 0-1155</inkml:trace>
+  <inkml:trace contextRef="#ctx0" brushRef="#br0" timeOffset="49838.4935">10698 814 6758,'0'0'1102,"0"0"-292,0 0-140,0 0 976,0 0 564,0 0-890,0 0-526,0 0-130,0 0 173,0 0 492,0 0 16,0 0-42,0 0 90,0 0-558,0 0-250,0 0 1006,0 0-852,0 0-79,0 0-87,0 0-79,0 0-70,0 0-52,0 0-43,0 0-71,0 3 27,-1 2-105,0 2-80,-4 8 61,-33 39-29,19-31-5,-1 0 0,-2-2 0,0-1-1,-2 0-126,-13 9 109,-1-2-67,35-25-77,0 0-68,1 0-64,-1 0-60,0 1-57,1-1-54,-1 0-50,0 1-47,-1 0-248,0 1-75,0-1-65,0 0-56,-1 1-159,1-1-43,-18 7-4134,14-9 3463,7-1 865,0 0-56,1 0-50,-1 0-44,0 0-256,1 0-43,-1 0-310,-1 0-869</inkml:trace>
+</inkml:ink>
+</file>
+
+<file path=ppt/ink/ink3.xml><?xml version="1.0" encoding="utf-8"?>
+<inkml:ink xmlns:inkml="http://www.w3.org/2003/InkML">
+  <inkml:definitions>
+    <inkml:context xml:id="ctx0">
+      <inkml:inkSource xml:id="inkSrc0">
+        <inkml:traceFormat>
+          <inkml:channel name="X" type="integer" min="-2.14748E9" max="2.14748E9" units="cm"/>
+          <inkml:channel name="Y" type="integer" min="-2.14748E9" max="2.14748E9" units="cm"/>
+          <inkml:channel name="F" type="integer" max="32767" units="dev"/>
+        </inkml:traceFormat>
+        <inkml:channelProperties>
+          <inkml:channelProperty channel="X" name="resolution" value="1000" units="1/cm"/>
+          <inkml:channelProperty channel="Y" name="resolution" value="1000" units="1/cm"/>
+          <inkml:channelProperty channel="F" name="resolution" value="0" units="1/dev"/>
+        </inkml:channelProperties>
+      </inkml:inkSource>
+      <inkml:timestamp xml:id="ts0" timeString="2018-04-17T06:33:22.622"/>
+    </inkml:context>
+    <inkml:brush xml:id="br0">
+      <inkml:brushProperty name="width" value="0.05" units="cm"/>
+      <inkml:brushProperty name="height" value="0.05" units="cm"/>
+      <inkml:brushProperty name="color" value="#E71224"/>
+    </inkml:brush>
+  </inkml:definitions>
+  <inkml:trace contextRef="#ctx0" brushRef="#br0">472 32 5958,'2'-1'354,"-1"-1"48,1 1 45,-1-1 42,0 1 39,0 0 33,0-2 653,0 1-39,-1 0 58,-2-4 2950,0 3-2444,1 2-753,0 0-52,-1 0-64,0 0-75,0 1-86,1-1-100,-1 0-110,-1 1-122,2-1-199,0 1-64,-1 0-66,1 0-70,-1 0-74,1-1-77,-1 1-80,1 0-84,-27 4 1114,0 7-99,0 5-87,2 4-78,0 4-65,2 0-54,-18 24 274,29-33-456,-26 33 363,1 3-49,4 2-67,3-1-86,18-26-132,1 2-37,-10 30 115,7-4-106,-11 69 192,19-62-142,7-4-53,3-35-125,0 0 0,1-1 0,2 1 0,0-1 0,1 0 0,7 14-85,-4-14 22,1-1 1,0 0-1,2 0 1,1 1-23,5 2 52,0 0 1,1-2 0,0 0 0,2-1-1,7 3-52,-4-4 63,1-1-1,1-1 0,1-2 1,25 11-63,-28-16 21,0 0 1,1-3-1,12 3-21,-5-4 0,0-1 0,1-2 0,-1-1 0,1-2 0,-1-1 0,1-1 0,-1-2 0,0-2 0,0-1 0,0-1 0,-1-2 0,0-1 0,-1-1 0,13-9 0,-23 9 0,-1-2 0,0 0 0,-1-1 0,-1-1 0,0-1 0,-1 0 0,-1-1 0,-1-1 0,0-1 0,-1 0 0,-2-1 0,0 0 0,-1-1 0,0-3 0,0 0 0,-1-2 0,-1 1 0,-2-1 0,0 0 0,-2-1 0,-1 1 0,-2-1 0,0 0 0,-2 0 0,-1 0 0,-1 0 0,-2-6 0,0 19 0,0 0 0,-1 0 0,-1 1 0,0 0 0,-1 0 0,-1 1 0,0 0 0,-1 0 0,0 1 0,0 0 0,-2 1 0,1 0 0,-2 0 0,1 1 0,-1 1 0,-1 0 0,0 0 0,-1 0 0,-28-15 0,0 2 0,-1 2 0,-2 2 0,1 1 0,-11 0 0,42 13-23,0 0-43,0 0-43,0 1-41,0-1-38,-1 0-38,1 0-36,-1 1-34,-13-4-392,0 0-116,-1 1-104,0 1-90,5 1 143,1 1-42,-23-2-999,5 2 112,-52 6-2442,89-2 3207,-1-1-65,1 1-60,-1 0-52,0 0-297,0-1-51,0 2-359,-3 0-1008,7-2 2836</inkml:trace>
+  <inkml:trace contextRef="#ctx0" brushRef="#br0" timeOffset="8077.6023">844 1242 5221,'0'0'812,"0"0"-370,0 0-118,0 0-45,0 0 58,0 0-117,0 0 40,0 0 214,0 0 82,0 0 131,0 0 995,0 0-1119,0 0 158,0 0-86,0 0 38,0 0 223,0 0 38,0 0 411,0 0-51,0 0-506,0 0-89,0 0 247,0 0 554,0 0-814,0 0-43,0 0 596,0 0 47,0 0-801,0 0-110,0 0-94,0 1-81,0-1-54,0 1-63,0 5 7,0-3-39,0-1 31,0 0 47,0 21 456,-1-1-113,0 0-99,0 1-83,0-2-79,0 1-50,0 13 30,3 24 43,0-33-108,1-1 48,2 2 68,16 54 111,5-3-78,6-4-67,7-4-57,-24-46-101,2-1-1,1 0 1,9 8-50,-8-11 15,1-2 0,1 0 1,0-2-1,1 0 0,1-1 1,9 4-16,27 10 30,1-2 0,1-3 0,1-3 0,31 5-30,58 9 82,52 1-82,9-9 114,56-6-114,216-4 14,-345-14-35,220 6 32,690 21 30,-699-17-63,-1 3-34,1477 6 170,-1230-24-95,-69 4-58,1167-29-301,-1420 13-69,1 5 84,1 4 67,-1 1 45,44-1-2,1060-28-203,-712 16 267,-2 2 58,-379 13 123,-71 1-76,-108-1-27,0-1-46,-29 1-20,1 0 46,53 0 10,177 0-36,-214 2 24,-1 1-61,14-1-123,-54 0 91,0 0-38,23 3 60,40 8 47,31 2 15,-134-13 138,-2 1-42,23 4-138,-20-3 96,1 0 51,-4-1 43,0 0 46,-1 0 27,1-1 44,1 0 48,1 1 54,-41-7-146,-2-8-66,-8-2-27,-49-7 33,-112-18 208,126 29-229,25 0-7,37 9-16,-1 0 1,0 1-1,0 0 1,0 0-1,-1 1-13,16 0 64,3-1 73,13-3 178,-14 3-248,0 2-41,146-7 19,78 10 108,-224-3-148,23 2 93,0 0 0,0 2 0,8 3-98,25 12 215,-35-6-61,-4 2 42,-12-2-123,-3 2 53,-2 6 76,-4 13 151,-6 0-13,-3-14-163,0-5-80,-1-3-61,-4 3-70,-1-1-67,0 0-63,0-2-62,-2 1-59,1-1-57,-1 0-53,0-1-52,-1 0-48,1-1-47,-1 1-44,0-1-41,0 0-39,-1-1-36,-15 11-802,0-1-129,0 0-97,27-16 845,1 0-52,0 0-46,-1-1-39,0 1-251,0 1-40,-1-1-303,-2 3-854,7-6 2180</inkml:trace>
+  <inkml:trace contextRef="#ctx0" brushRef="#br0" timeOffset="268148.3777">4865 1178 2530,'0'1'2282,"0"0"-149,0-1-116,1 1-115,-1 0-111,1 0-109,-1 0-104,1 0-103,0 0-99,-1 1-97,1-1-92,0 0-90,0 1-88,0-1-83,0 0-81,0 1-78,1 0 55,-1 0-102,1 0-98,0 0-92,0 0-86,-1 0-81,1 1-77,0-1-71,0 1-42,1-1-86,-1 1-76,1 0-68,0 1-86,0-1-68,0 1-111,3 3-241,2 2-297,-5-6 621,0 0 44,-1 0 76,0-1 45,0 0 53,0 1 60,-1-1 44,1-1 51,-1 1 54,1 0 59,-1 0 63,0-1 67,1 1 70,-1-1 75,32 37 76,3-4-97,3-2-79,2-1-62,2 2-25,19 20 113,-38-33-355,0-1 1,1-1-1,6 2-93,15 11 93,-3 2-55,-5-4-38,2-2 0,1-1 0,2-2 0,0-2 0,12 3 0,6-2 0,0-1 0,40 6 0,-34-10 0,-23-6 0,1-3 0,0-2 0,43 2 0,140-5 0,-166-4 0,39-7 0,-1-4 0,0-5 0,75-22 0,-135 31 0,-1-3 0,-1-1 0,0-2 0,-1-2 0,0-1 0,-1-1 0,-1-3 0,23-16 0,-13 3 0,-2-2 0,-1-1 0,-2-2 0,-1-3 0,5-9 0,-37 39 0,1 0 0,-2 0 0,1-1 0,-2 0 0,1 0 0,-2-1 0,1 1 0,-2-1 0,1-6 0,1-9 0,-1-1 0,-1 1 0,-2-25 0,1 25 0,2 1 0,1-1 0,0 1 0,3 0 0,0 0 0,1 1 0,10-18 0,15-46 0,-20 52 0,2 1 0,1 0 0,3 1 0,0 1 0,2 0 0,19-20 0,-23 35 0,2 1 0,0 1 0,1 1 0,12-7 0,-10 7 0,35-24 0,3 3 0,20-8 0,47-28 0,-124 71-22,0 1-47,-1-1-50,1 0-52,-1 0-55,1 0-58,-1-1-62,0 1-63,0-1-67,0 1-70,0-1-73,0 1-75,0-1-78,0 0-82,-1 0-83,1 1-88,0-1-35,0 0-83,-1 1-87,1-1-89,-1 2-164,0-1-118,0 1-106,0-1-93,0 0-462,0-1-92,1 0-559,1-2-1555</inkml:trace>
+  <inkml:trace contextRef="#ctx0" brushRef="#br0" timeOffset="269214.0188">8399 216 3203,'0'0'967,"0"0"-359,0 0-83,0 0-130,0 0-2,0 0 82,0 0-53,0 0 46,0 0 1920,0 0-1623,0 0-81,0 0-69,0 0-58,0 0 54,0 0 716,0 0 632,0 0-1069,0 0-72,0 0-263,0 0-34,0 0 425,0 0-122,-1 0-112,0 0-106,1 0-98,-1 0-88,0 0-82,0 0-46,-1 0-80,1 0-71,0 0-57,-1 0-48,1 0-35,-6 0-142,5 0 158,0 0 82,0 0 12,1 0 46,0 0 53,0 0 60,-19 0-198,-1-1 85,4 1 26,-1 0 35,-63-2 924,55 1-870,1 0-95,12 1-133,0-1-41,0 1-43,0 0-50,0-1-53,-1 1-60,1 0-62,0-1-68,0 1-73,0 0-78,0-1-82,0 1-87,0 0-91,1 0-97,-1 0-101,0 0-106,11 0 390,1 0-53,-1 0-46,1 0-40,-1 0-205,1 0-40,-1 0-246,-1 0-688</inkml:trace>
+  <inkml:trace contextRef="#ctx0" brushRef="#br0" timeOffset="270002.5518">8351 236 2178,'0'0'1352,"0"0"-959,0 0-45,0 0-55,0 0-47,0 0 6,0 0 83,0 0 28,0 0-31,0 0 43,0 0-145,0 0 34,0 0 367,0 0 108,0 0 1714,0 0-1504,0 0-82,0 0-79,0 0-72,0 0-192,0 0-35,0 0 62,0 0 234,0 0-794,0 0 77,0 0 70,0-1 66,0 1 61,0 0 56,0 0 51,0-1 46,0 1 31,0 0 35,-1-1 569,1 0 222,-1-1 1800,1 1-2039,0 1-296,0 0-63,-1 0-75,1-1-89,0 1-256,0 0-39,0 0-42,0 1-45,0-1-49,0 0-50,-1 0-54,1 1-57,-5 28 729,0 40 950,5-48-1161,1 1-58,1 2-45,-1 0-119,1-12-160,-1 1-40,0-1-42,0 0-46,0 5-108,1-1-103,-1 1-110,1 0-121,-2-9 210,1 1-34,-1-1-34,1 0-35,-1 1-37,0-1-36,0 0-39,0 0-40,0-6-4,0 0-40,0 2-701,0 1-396,0 3-1000</inkml:trace>
+  <inkml:trace contextRef="#ctx0" brushRef="#br0" timeOffset="287063.9433">4564 33 6951,'-2'0'999,"-1"0"-41,1 0-40,0 0-39,-1 0-38,1 0-38,-1-1-36,1 1-37,0 0-34,-1 0-35,-2 0 563,0-1-128,0 1-119,0-1-39,-1 1-127,1 0-117,-1-1-109,0 1-101,0 0-91,1 0-83,-1 0-73,0 0-69,1 0-55,-1 0-45,0 1-38,-5 0-51,-7 3-97,10-1 92,1 0 46,-1 0 69,0 1 98,4-1-50,0-1 33,1 1 36,-1 0 39,0 0 42,0 0 46,3-1-295,-19 16 426,-1 0-74,1 1-63,-1 1-51,-16 15 131,-21 25 166,35-34-299,5-3-35,-3 4 82,-5-2 85,-4 4 85,4 0-60,4 3-57,4 1-52,4 2-50,4 2-45,5 3-41,3 3-39,2-23-33,1-1 1,1 1-1,1 0 0,0-1 0,5 11-114,-4-15 91,2-1 0,0 1 0,0-1-1,2 0 1,0 0 0,0 0 0,2 0-91,15 14 87,44 23 242,-41-32-229,-2 0-61,-2-2-39,-1-1 0,2-2 0,0 0 0,9 2 0,-25-13 0,44 22 0,2-3 0,33 8 0,-44-17 0,0-3 0,1-1 0,-1-3 0,2-1 0,29-2 0,-42-2 0,0-3 0,0 0 0,0-2 0,-1-2 0,1-1 0,0-2 0,-22 6 0,-1 0 0,0-1 0,0 0 0,0-1 0,0 0 0,-1-1 0,0 0 0,0 0 0,0-1 0,-1 0 0,0-1 0,-1 0 0,1 0 0,-2 0 0,1-1 0,-1 0 0,0-1 0,-1 1 0,0-1 0,0-2 0,5-16-8,-1 0-1,-2-1 1,-1-1 0,-1 1 0,0-22 8,-3 19-21,-2 0 0,-1 0 1,-1 0-1,-2 0 0,-2 1 1,0 0-1,-2 0 0,-8-18 21,7 26-17,0 1-1,-2 0 1,0 0-1,-2 1 1,0 1 0,-1 0-1,-1 1 1,-1 1-1,-1 0 1,0 1 0,-7-4 17,8 8-11,-1 1 0,-1 1 0,1 0 0,-2 1 0,0 2 0,0 0 0,0 0 0,-20-3 11,18 6-81,1 1 34,-77-7-42,61 9-39,7 2-79,14 0 58,0 0-34,0 0-39,0 0-43,1 0-46,-1 0-50,-2 1-106,0-1-72,1 0-78,-1 0-84,8 0 245,-1 0-40,0 0-43,0 0-49,0 1-53,0-1-57,0 1-63,0 0-67,2 0 116,0 0-42,-8 1-859,-3 2-464,-10 2-1196</inkml:trace>
+</inkml:ink>
 </file>
 
 <file path=ppt/slideLayouts/slideLayout1.xml><?xml version="1.0" encoding="utf-8"?>
@@ -3559,16 +3655,25 @@
             <p:ph type="title"/>
           </p:nvPr>
         </p:nvSpPr>
-        <p:spPr/>
+        <p:spPr>
+          <a:xfrm>
+            <a:off x="838200" y="365125"/>
+            <a:ext cx="10515600" cy="717055"/>
+          </a:xfrm>
+        </p:spPr>
         <p:txBody>
           <a:bodyPr/>
           <a:lstStyle/>
           <a:p>
             <a:r>
-              <a:rPr lang="en-US" dirty="0"/>
+              <a:rPr lang="en-US" dirty="0">
+                <a:latin typeface="Raleway" panose="020B0503030101060003" pitchFamily="34" charset="0"/>
+              </a:rPr>
               <a:t>Covariate inclusion</a:t>
             </a:r>
-            <a:endParaRPr lang="en-GB" dirty="0"/>
+            <a:endParaRPr lang="en-GB" dirty="0">
+              <a:latin typeface="Raleway" panose="020B0503030101060003" pitchFamily="34" charset="0"/>
+            </a:endParaRPr>
           </a:p>
         </p:txBody>
       </p:sp>
@@ -3588,12 +3693,294 @@
             <p:ph idx="1"/>
           </p:nvPr>
         </p:nvSpPr>
-        <p:spPr/>
-        <p:txBody>
-          <a:bodyPr/>
-          <a:lstStyle/>
-          <a:p>
-            <a:endParaRPr lang="en-GB"/>
+        <p:spPr>
+          <a:xfrm>
+            <a:off x="838200" y="1082180"/>
+            <a:ext cx="10515600" cy="5094783"/>
+          </a:xfrm>
+        </p:spPr>
+        <p:txBody>
+          <a:bodyPr>
+            <a:normAutofit/>
+          </a:bodyPr>
+          <a:lstStyle/>
+          <a:p>
+            <a:r>
+              <a:rPr lang="en-US" sz="2400" dirty="0">
+                <a:latin typeface="Raleway" panose="020B0503030101060003" pitchFamily="34" charset="0"/>
+              </a:rPr>
+              <a:t>For every detection function we need to be able to let the user:</a:t>
+            </a:r>
+          </a:p>
+          <a:p>
+            <a:pPr lvl="1"/>
+            <a:r>
+              <a:rPr lang="en-US" sz="1800" dirty="0">
+                <a:latin typeface="Raleway" panose="020B0503030101060003" pitchFamily="34" charset="0"/>
+              </a:rPr>
+              <a:t>Pick their own formula for the intercept</a:t>
+            </a:r>
+          </a:p>
+          <a:p>
+            <a:pPr lvl="1"/>
+            <a:r>
+              <a:rPr lang="en-US" sz="1800" dirty="0">
+                <a:latin typeface="Raleway" panose="020B0503030101060003" pitchFamily="34" charset="0"/>
+              </a:rPr>
+              <a:t>Pick their own formula for the x-direction</a:t>
+            </a:r>
+          </a:p>
+          <a:p>
+            <a:pPr lvl="1"/>
+            <a:r>
+              <a:rPr lang="en-US" sz="1800" dirty="0">
+                <a:latin typeface="Raleway" panose="020B0503030101060003" pitchFamily="34" charset="0"/>
+              </a:rPr>
+              <a:t>Pick their own formula for the y-direction</a:t>
+            </a:r>
+          </a:p>
+          <a:p>
+            <a:pPr lvl="1"/>
+            <a:r>
+              <a:rPr lang="en-US" sz="1800" dirty="0">
+                <a:latin typeface="Raleway" panose="020B0503030101060003" pitchFamily="34" charset="0"/>
+              </a:rPr>
+              <a:t>Give them the freedom to have different formulas in each direction at the same time</a:t>
+            </a:r>
+          </a:p>
+          <a:p>
+            <a:pPr lvl="1"/>
+            <a:r>
+              <a:rPr lang="en-US" sz="1800" dirty="0">
+                <a:latin typeface="Raleway" panose="020B0503030101060003" pitchFamily="34" charset="0"/>
+              </a:rPr>
+              <a:t>Check that the user’s choices are possible with the detection function they chose!</a:t>
+            </a:r>
+            <a:endParaRPr lang="en-GB" sz="1800" dirty="0">
+              <a:latin typeface="Raleway" panose="020B0503030101060003" pitchFamily="34" charset="0"/>
+            </a:endParaRPr>
+          </a:p>
+        </p:txBody>
+      </p:sp>
+      <p:pic>
+        <p:nvPicPr>
+          <p:cNvPr id="4" name="Picture 3">
+            <a:extLst>
+              <a:ext uri="{FF2B5EF4-FFF2-40B4-BE49-F238E27FC236}">
+                <a16:creationId xmlns:a16="http://schemas.microsoft.com/office/drawing/2014/main" id="{6C1E9753-3D50-44B3-B82A-8F745B45A0CC}"/>
+              </a:ext>
+            </a:extLst>
+          </p:cNvPr>
+          <p:cNvPicPr>
+            <a:picLocks noChangeAspect="1"/>
+          </p:cNvPicPr>
+          <p:nvPr/>
+        </p:nvPicPr>
+        <p:blipFill>
+          <a:blip r:embed="rId2"/>
+          <a:stretch>
+            <a:fillRect/>
+          </a:stretch>
+        </p:blipFill>
+        <p:spPr>
+          <a:xfrm>
+            <a:off x="545227" y="3160298"/>
+            <a:ext cx="5945056" cy="3465018"/>
+          </a:xfrm>
+          <a:prstGeom prst="rect">
+            <a:avLst/>
+          </a:prstGeom>
+        </p:spPr>
+      </p:pic>
+      <p:sp>
+        <p:nvSpPr>
+          <p:cNvPr id="5" name="TextBox 4">
+            <a:extLst>
+              <a:ext uri="{FF2B5EF4-FFF2-40B4-BE49-F238E27FC236}">
+                <a16:creationId xmlns:a16="http://schemas.microsoft.com/office/drawing/2014/main" id="{0996E74D-8EA8-48F7-9F1D-DB092162FCBD}"/>
+              </a:ext>
+            </a:extLst>
+          </p:cNvPr>
+          <p:cNvSpPr txBox="1"/>
+          <p:nvPr/>
+        </p:nvSpPr>
+        <p:spPr>
+          <a:xfrm rot="19796570">
+            <a:off x="1714828" y="3433420"/>
+            <a:ext cx="2087418" cy="584775"/>
+          </a:xfrm>
+          <a:prstGeom prst="rect">
+            <a:avLst/>
+          </a:prstGeom>
+          <a:noFill/>
+        </p:spPr>
+        <p:txBody>
+          <a:bodyPr wrap="square" rtlCol="0">
+            <a:spAutoFit/>
+          </a:bodyPr>
+          <a:lstStyle/>
+          <a:p>
+            <a:r>
+              <a:rPr lang="en-US" sz="3200" b="1" dirty="0">
+                <a:solidFill>
+                  <a:srgbClr val="FF0000"/>
+                </a:solidFill>
+                <a:latin typeface="Raleway" panose="020B0503030101060003" pitchFamily="34" charset="0"/>
+              </a:rPr>
+              <a:t>LOTS</a:t>
+            </a:r>
+            <a:endParaRPr lang="en-GB" sz="3200" b="1" dirty="0">
+              <a:solidFill>
+                <a:srgbClr val="FF0000"/>
+              </a:solidFill>
+              <a:latin typeface="Raleway" panose="020B0503030101060003" pitchFamily="34" charset="0"/>
+            </a:endParaRPr>
+          </a:p>
+        </p:txBody>
+      </p:sp>
+      <p:sp>
+        <p:nvSpPr>
+          <p:cNvPr id="6" name="TextBox 5">
+            <a:extLst>
+              <a:ext uri="{FF2B5EF4-FFF2-40B4-BE49-F238E27FC236}">
+                <a16:creationId xmlns:a16="http://schemas.microsoft.com/office/drawing/2014/main" id="{77DF9329-6AEC-4745-80B5-66352A489686}"/>
+              </a:ext>
+            </a:extLst>
+          </p:cNvPr>
+          <p:cNvSpPr txBox="1"/>
+          <p:nvPr/>
+        </p:nvSpPr>
+        <p:spPr>
+          <a:xfrm rot="2453348">
+            <a:off x="4390445" y="3498207"/>
+            <a:ext cx="646331" cy="584775"/>
+          </a:xfrm>
+          <a:prstGeom prst="rect">
+            <a:avLst/>
+          </a:prstGeom>
+          <a:noFill/>
+        </p:spPr>
+        <p:txBody>
+          <a:bodyPr wrap="none" rtlCol="0">
+            <a:spAutoFit/>
+          </a:bodyPr>
+          <a:lstStyle/>
+          <a:p>
+            <a:r>
+              <a:rPr lang="en-US" sz="3200" b="1" dirty="0">
+                <a:solidFill>
+                  <a:srgbClr val="FF0000"/>
+                </a:solidFill>
+              </a:rPr>
+              <a:t>OF</a:t>
+            </a:r>
+            <a:endParaRPr lang="en-GB" sz="3200" b="1" dirty="0">
+              <a:solidFill>
+                <a:srgbClr val="FF0000"/>
+              </a:solidFill>
+            </a:endParaRPr>
+          </a:p>
+        </p:txBody>
+      </p:sp>
+      <p:sp>
+        <p:nvSpPr>
+          <p:cNvPr id="7" name="TextBox 6">
+            <a:extLst>
+              <a:ext uri="{FF2B5EF4-FFF2-40B4-BE49-F238E27FC236}">
+                <a16:creationId xmlns:a16="http://schemas.microsoft.com/office/drawing/2014/main" id="{A2AB0A90-B4FA-4913-9C7E-66206A5831C9}"/>
+              </a:ext>
+            </a:extLst>
+          </p:cNvPr>
+          <p:cNvSpPr txBox="1"/>
+          <p:nvPr/>
+        </p:nvSpPr>
+        <p:spPr>
+          <a:xfrm>
+            <a:off x="2157261" y="4433493"/>
+            <a:ext cx="3045204" cy="1200329"/>
+          </a:xfrm>
+          <a:prstGeom prst="rect">
+            <a:avLst/>
+          </a:prstGeom>
+          <a:noFill/>
+        </p:spPr>
+        <p:txBody>
+          <a:bodyPr wrap="square" rtlCol="0">
+            <a:spAutoFit/>
+          </a:bodyPr>
+          <a:lstStyle/>
+          <a:p>
+            <a:r>
+              <a:rPr lang="en-US" sz="7200" b="1" dirty="0">
+                <a:solidFill>
+                  <a:srgbClr val="FF0000"/>
+                </a:solidFill>
+                <a:latin typeface="Raleway" panose="020B0503030101060003" pitchFamily="34" charset="0"/>
+              </a:rPr>
+              <a:t>CODE</a:t>
+            </a:r>
+            <a:endParaRPr lang="en-GB" sz="3200" b="1" dirty="0">
+              <a:solidFill>
+                <a:srgbClr val="FF0000"/>
+              </a:solidFill>
+              <a:latin typeface="Raleway" panose="020B0503030101060003" pitchFamily="34" charset="0"/>
+            </a:endParaRPr>
+          </a:p>
+        </p:txBody>
+      </p:sp>
+      <p:sp>
+        <p:nvSpPr>
+          <p:cNvPr id="8" name="TextBox 7">
+            <a:extLst>
+              <a:ext uri="{FF2B5EF4-FFF2-40B4-BE49-F238E27FC236}">
+                <a16:creationId xmlns:a16="http://schemas.microsoft.com/office/drawing/2014/main" id="{A1932393-4C04-4322-98C4-D61C69703960}"/>
+              </a:ext>
+            </a:extLst>
+          </p:cNvPr>
+          <p:cNvSpPr txBox="1"/>
+          <p:nvPr/>
+        </p:nvSpPr>
+        <p:spPr>
+          <a:xfrm>
+            <a:off x="6783256" y="3358012"/>
+            <a:ext cx="3523376" cy="2308324"/>
+          </a:xfrm>
+          <a:prstGeom prst="rect">
+            <a:avLst/>
+          </a:prstGeom>
+          <a:noFill/>
+        </p:spPr>
+        <p:txBody>
+          <a:bodyPr wrap="square" rtlCol="0">
+            <a:spAutoFit/>
+          </a:bodyPr>
+          <a:lstStyle/>
+          <a:p>
+            <a:pPr marL="285750" indent="-285750">
+              <a:buFont typeface="Arial" panose="020B0604020202020204" pitchFamily="34" charset="0"/>
+              <a:buChar char="•"/>
+            </a:pPr>
+            <a:r>
+              <a:rPr lang="en-US" dirty="0">
+                <a:latin typeface="Raleway" panose="020B0503030101060003" pitchFamily="34" charset="0"/>
+              </a:rPr>
+              <a:t>We need to make design matrices for each formula</a:t>
+            </a:r>
+          </a:p>
+          <a:p>
+            <a:pPr marL="285750" indent="-285750">
+              <a:buFont typeface="Arial" panose="020B0604020202020204" pitchFamily="34" charset="0"/>
+              <a:buChar char="•"/>
+            </a:pPr>
+            <a:r>
+              <a:rPr lang="en-US" dirty="0">
+                <a:latin typeface="Raleway" panose="020B0503030101060003" pitchFamily="34" charset="0"/>
+              </a:rPr>
+              <a:t>Then use linear predictors to combine those with estimated covariate parameters to produce the detection function parameters</a:t>
+            </a:r>
+            <a:endParaRPr lang="en-GB" dirty="0">
+              <a:latin typeface="Raleway" panose="020B0503030101060003" pitchFamily="34" charset="0"/>
+            </a:endParaRPr>
           </a:p>
         </p:txBody>
       </p:sp>
@@ -3627,6 +4014,36 @@
           <a:chExt cx="0" cy="0"/>
         </a:xfrm>
       </p:grpSpPr>
+      <p:pic>
+        <p:nvPicPr>
+          <p:cNvPr id="9" name="Picture 8">
+            <a:extLst>
+              <a:ext uri="{FF2B5EF4-FFF2-40B4-BE49-F238E27FC236}">
+                <a16:creationId xmlns:a16="http://schemas.microsoft.com/office/drawing/2014/main" id="{BF191A43-9F16-41DC-8D11-058DD26A9D1B}"/>
+              </a:ext>
+            </a:extLst>
+          </p:cNvPr>
+          <p:cNvPicPr>
+            <a:picLocks noChangeAspect="1"/>
+          </p:cNvPicPr>
+          <p:nvPr/>
+        </p:nvPicPr>
+        <p:blipFill>
+          <a:blip r:embed="rId2"/>
+          <a:stretch>
+            <a:fillRect/>
+          </a:stretch>
+        </p:blipFill>
+        <p:spPr>
+          <a:xfrm>
+            <a:off x="4488234" y="3205018"/>
+            <a:ext cx="6621830" cy="1745128"/>
+          </a:xfrm>
+          <a:prstGeom prst="rect">
+            <a:avLst/>
+          </a:prstGeom>
+        </p:spPr>
+      </p:pic>
       <p:sp>
         <p:nvSpPr>
           <p:cNvPr id="2" name="Title 1">
@@ -3643,16 +4060,25 @@
             <p:ph type="title"/>
           </p:nvPr>
         </p:nvSpPr>
-        <p:spPr/>
+        <p:spPr>
+          <a:xfrm>
+            <a:off x="838200" y="365126"/>
+            <a:ext cx="10515600" cy="708666"/>
+          </a:xfrm>
+        </p:spPr>
         <p:txBody>
           <a:bodyPr/>
           <a:lstStyle/>
           <a:p>
             <a:r>
-              <a:rPr lang="en-US" dirty="0"/>
+              <a:rPr lang="en-US" dirty="0">
+                <a:latin typeface="Raleway" panose="020B0503030101060003" pitchFamily="34" charset="0"/>
+              </a:rPr>
               <a:t>Covariate inclusion</a:t>
             </a:r>
-            <a:endParaRPr lang="en-GB" dirty="0"/>
+            <a:endParaRPr lang="en-GB" dirty="0">
+              <a:latin typeface="Raleway" panose="020B0503030101060003" pitchFamily="34" charset="0"/>
+            </a:endParaRPr>
           </a:p>
         </p:txBody>
       </p:sp>
@@ -3672,15 +4098,232 @@
             <p:ph idx="1"/>
           </p:nvPr>
         </p:nvSpPr>
-        <p:spPr/>
+        <p:spPr>
+          <a:xfrm>
+            <a:off x="838200" y="1073792"/>
+            <a:ext cx="10762673" cy="5103171"/>
+          </a:xfrm>
+        </p:spPr>
         <p:txBody>
           <a:bodyPr/>
           <a:lstStyle/>
           <a:p>
-            <a:endParaRPr lang="en-GB"/>
-          </a:p>
-        </p:txBody>
-      </p:sp>
+            <a:r>
+              <a:rPr lang="en-US" dirty="0">
+                <a:latin typeface="Raleway" panose="020B0503030101060003" pitchFamily="34" charset="0"/>
+              </a:rPr>
+              <a:t>Try an example:</a:t>
+            </a:r>
+          </a:p>
+          <a:p>
+            <a:r>
+              <a:rPr lang="en-US" dirty="0">
+                <a:latin typeface="Raleway" panose="020B0503030101060003" pitchFamily="34" charset="0"/>
+              </a:rPr>
+              <a:t>Covariates: ‘forest.cover’ (continuous), ‘species’ (factor with 3 levels) and ‘size’ (continuous)</a:t>
+            </a:r>
+          </a:p>
+          <a:p>
+            <a:r>
+              <a:rPr lang="en-US" dirty="0">
+                <a:latin typeface="Raleway" panose="020B0503030101060003" pitchFamily="34" charset="0"/>
+              </a:rPr>
+              <a:t>Formulas:</a:t>
+            </a:r>
+          </a:p>
+          <a:p>
+            <a:r>
+              <a:rPr lang="en-US" dirty="0">
+                <a:latin typeface="Raleway" panose="020B0503030101060003" pitchFamily="34" charset="0"/>
+              </a:rPr>
+              <a:t>‘ip2’ detection function:</a:t>
+            </a:r>
+            <a:endParaRPr lang="en-GB" dirty="0">
+              <a:latin typeface="Raleway" panose="020B0503030101060003" pitchFamily="34" charset="0"/>
+            </a:endParaRPr>
+          </a:p>
+        </p:txBody>
+      </p:sp>
+      <p:pic>
+        <p:nvPicPr>
+          <p:cNvPr id="6" name="Picture 5">
+            <a:extLst>
+              <a:ext uri="{FF2B5EF4-FFF2-40B4-BE49-F238E27FC236}">
+                <a16:creationId xmlns:a16="http://schemas.microsoft.com/office/drawing/2014/main" id="{ABA760F0-18C3-4F44-88E6-4589E67473BE}"/>
+              </a:ext>
+            </a:extLst>
+          </p:cNvPr>
+          <p:cNvPicPr>
+            <a:picLocks noChangeAspect="1"/>
+          </p:cNvPicPr>
+          <p:nvPr/>
+        </p:nvPicPr>
+        <p:blipFill>
+          <a:blip r:embed="rId3"/>
+          <a:stretch>
+            <a:fillRect/>
+          </a:stretch>
+        </p:blipFill>
+        <p:spPr>
+          <a:xfrm>
+            <a:off x="3131704" y="2591413"/>
+            <a:ext cx="2448274" cy="338823"/>
+          </a:xfrm>
+          <a:prstGeom prst="rect">
+            <a:avLst/>
+          </a:prstGeom>
+        </p:spPr>
+      </p:pic>
+      <p:pic>
+        <p:nvPicPr>
+          <p:cNvPr id="7" name="Picture 6">
+            <a:extLst>
+              <a:ext uri="{FF2B5EF4-FFF2-40B4-BE49-F238E27FC236}">
+                <a16:creationId xmlns:a16="http://schemas.microsoft.com/office/drawing/2014/main" id="{263C1417-018A-4699-8B8A-8E979F635892}"/>
+              </a:ext>
+            </a:extLst>
+          </p:cNvPr>
+          <p:cNvPicPr>
+            <a:picLocks noChangeAspect="1"/>
+          </p:cNvPicPr>
+          <p:nvPr/>
+        </p:nvPicPr>
+        <p:blipFill>
+          <a:blip r:embed="rId4"/>
+          <a:stretch>
+            <a:fillRect/>
+          </a:stretch>
+        </p:blipFill>
+        <p:spPr>
+          <a:xfrm>
+            <a:off x="6219536" y="2591413"/>
+            <a:ext cx="1776090" cy="338823"/>
+          </a:xfrm>
+          <a:prstGeom prst="rect">
+            <a:avLst/>
+          </a:prstGeom>
+        </p:spPr>
+      </p:pic>
+      <p:pic>
+        <p:nvPicPr>
+          <p:cNvPr id="8" name="Picture 7">
+            <a:extLst>
+              <a:ext uri="{FF2B5EF4-FFF2-40B4-BE49-F238E27FC236}">
+                <a16:creationId xmlns:a16="http://schemas.microsoft.com/office/drawing/2014/main" id="{2A70BCB5-D185-40FD-833B-32A49D1EBA53}"/>
+              </a:ext>
+            </a:extLst>
+          </p:cNvPr>
+          <p:cNvPicPr>
+            <a:picLocks noChangeAspect="1"/>
+          </p:cNvPicPr>
+          <p:nvPr/>
+        </p:nvPicPr>
+        <p:blipFill>
+          <a:blip r:embed="rId5"/>
+          <a:stretch>
+            <a:fillRect/>
+          </a:stretch>
+        </p:blipFill>
+        <p:spPr>
+          <a:xfrm>
+            <a:off x="8565571" y="2570613"/>
+            <a:ext cx="1298866" cy="380421"/>
+          </a:xfrm>
+          <a:prstGeom prst="rect">
+            <a:avLst/>
+          </a:prstGeom>
+        </p:spPr>
+      </p:pic>
+      <p:pic>
+        <p:nvPicPr>
+          <p:cNvPr id="10" name="Picture 9">
+            <a:extLst>
+              <a:ext uri="{FF2B5EF4-FFF2-40B4-BE49-F238E27FC236}">
+                <a16:creationId xmlns:a16="http://schemas.microsoft.com/office/drawing/2014/main" id="{3A9469CD-E6A2-4773-8E1D-3287ED34EB57}"/>
+              </a:ext>
+            </a:extLst>
+          </p:cNvPr>
+          <p:cNvPicPr>
+            <a:picLocks noChangeAspect="1"/>
+          </p:cNvPicPr>
+          <p:nvPr/>
+        </p:nvPicPr>
+        <p:blipFill>
+          <a:blip r:embed="rId6"/>
+          <a:stretch>
+            <a:fillRect/>
+          </a:stretch>
+        </p:blipFill>
+        <p:spPr>
+          <a:xfrm>
+            <a:off x="591127" y="4794066"/>
+            <a:ext cx="4143180" cy="434919"/>
+          </a:xfrm>
+          <a:prstGeom prst="rect">
+            <a:avLst/>
+          </a:prstGeom>
+        </p:spPr>
+      </p:pic>
+      <p:pic>
+        <p:nvPicPr>
+          <p:cNvPr id="11" name="Picture 10">
+            <a:extLst>
+              <a:ext uri="{FF2B5EF4-FFF2-40B4-BE49-F238E27FC236}">
+                <a16:creationId xmlns:a16="http://schemas.microsoft.com/office/drawing/2014/main" id="{8683E080-2B4C-4598-AC34-5EDC6A00E197}"/>
+              </a:ext>
+            </a:extLst>
+          </p:cNvPr>
+          <p:cNvPicPr>
+            <a:picLocks noChangeAspect="1"/>
+          </p:cNvPicPr>
+          <p:nvPr/>
+        </p:nvPicPr>
+        <p:blipFill>
+          <a:blip r:embed="rId7"/>
+          <a:stretch>
+            <a:fillRect/>
+          </a:stretch>
+        </p:blipFill>
+        <p:spPr>
+          <a:xfrm>
+            <a:off x="517236" y="5249938"/>
+            <a:ext cx="4132763" cy="883431"/>
+          </a:xfrm>
+          <a:prstGeom prst="rect">
+            <a:avLst/>
+          </a:prstGeom>
+        </p:spPr>
+      </p:pic>
+      <p:pic>
+        <p:nvPicPr>
+          <p:cNvPr id="12" name="Picture 11">
+            <a:extLst>
+              <a:ext uri="{FF2B5EF4-FFF2-40B4-BE49-F238E27FC236}">
+                <a16:creationId xmlns:a16="http://schemas.microsoft.com/office/drawing/2014/main" id="{D2CE4D60-A6CC-4187-8C47-757C81C952A0}"/>
+              </a:ext>
+            </a:extLst>
+          </p:cNvPr>
+          <p:cNvPicPr>
+            <a:picLocks noChangeAspect="1"/>
+          </p:cNvPicPr>
+          <p:nvPr/>
+        </p:nvPicPr>
+        <p:blipFill>
+          <a:blip r:embed="rId8"/>
+          <a:stretch>
+            <a:fillRect/>
+          </a:stretch>
+        </p:blipFill>
+        <p:spPr>
+          <a:xfrm>
+            <a:off x="517236" y="6112624"/>
+            <a:ext cx="3474540" cy="452382"/>
+          </a:xfrm>
+          <a:prstGeom prst="rect">
+            <a:avLst/>
+          </a:prstGeom>
+        </p:spPr>
+      </p:pic>
     </p:spTree>
     <p:extLst>
       <p:ext uri="{BB962C8B-B14F-4D97-AF65-F5344CB8AC3E}">
@@ -3711,6 +4354,36 @@
           <a:chExt cx="0" cy="0"/>
         </a:xfrm>
       </p:grpSpPr>
+      <p:pic>
+        <p:nvPicPr>
+          <p:cNvPr id="7" name="Picture 6">
+            <a:extLst>
+              <a:ext uri="{FF2B5EF4-FFF2-40B4-BE49-F238E27FC236}">
+                <a16:creationId xmlns:a16="http://schemas.microsoft.com/office/drawing/2014/main" id="{152D1436-BA12-4835-9C4D-32C595FDDEC9}"/>
+              </a:ext>
+            </a:extLst>
+          </p:cNvPr>
+          <p:cNvPicPr>
+            <a:picLocks noChangeAspect="1"/>
+          </p:cNvPicPr>
+          <p:nvPr/>
+        </p:nvPicPr>
+        <p:blipFill>
+          <a:blip r:embed="rId2"/>
+          <a:stretch>
+            <a:fillRect/>
+          </a:stretch>
+        </p:blipFill>
+        <p:spPr>
+          <a:xfrm>
+            <a:off x="5392486" y="2517294"/>
+            <a:ext cx="4481283" cy="3621946"/>
+          </a:xfrm>
+          <a:prstGeom prst="rect">
+            <a:avLst/>
+          </a:prstGeom>
+        </p:spPr>
+      </p:pic>
       <p:sp>
         <p:nvSpPr>
           <p:cNvPr id="2" name="Title 1">
@@ -3727,16 +4400,25 @@
             <p:ph type="title"/>
           </p:nvPr>
         </p:nvSpPr>
-        <p:spPr/>
+        <p:spPr>
+          <a:xfrm>
+            <a:off x="838200" y="365126"/>
+            <a:ext cx="10515600" cy="893224"/>
+          </a:xfrm>
+        </p:spPr>
         <p:txBody>
           <a:bodyPr/>
           <a:lstStyle/>
           <a:p>
             <a:r>
-              <a:rPr lang="en-US" dirty="0"/>
+              <a:rPr lang="en-US" dirty="0">
+                <a:latin typeface="Raleway" panose="020B0503030101060003" pitchFamily="34" charset="0"/>
+              </a:rPr>
               <a:t>Goodness of fit and plotting functions</a:t>
             </a:r>
-            <a:endParaRPr lang="en-GB" dirty="0"/>
+            <a:endParaRPr lang="en-GB" dirty="0">
+              <a:latin typeface="Raleway" panose="020B0503030101060003" pitchFamily="34" charset="0"/>
+            </a:endParaRPr>
           </a:p>
         </p:txBody>
       </p:sp>
@@ -3756,15 +4438,96 @@
             <p:ph idx="1"/>
           </p:nvPr>
         </p:nvSpPr>
-        <p:spPr/>
+        <p:spPr>
+          <a:xfrm>
+            <a:off x="838200" y="1258350"/>
+            <a:ext cx="10515600" cy="4918613"/>
+          </a:xfrm>
+        </p:spPr>
         <p:txBody>
           <a:bodyPr/>
           <a:lstStyle/>
           <a:p>
-            <a:endParaRPr lang="en-GB"/>
-          </a:p>
-        </p:txBody>
-      </p:sp>
+            <a:r>
+              <a:rPr lang="en-US" dirty="0">
+                <a:latin typeface="Raleway" panose="020B0503030101060003" pitchFamily="34" charset="0"/>
+              </a:rPr>
+              <a:t>Generalized code</a:t>
+            </a:r>
+          </a:p>
+          <a:p>
+            <a:r>
+              <a:rPr lang="en-US" dirty="0">
+                <a:latin typeface="Raleway" panose="020B0503030101060003" pitchFamily="34" charset="0"/>
+              </a:rPr>
+              <a:t>Options to plot at given level of covariates</a:t>
+            </a:r>
+            <a:endParaRPr lang="en-GB" dirty="0">
+              <a:latin typeface="Raleway" panose="020B0503030101060003" pitchFamily="34" charset="0"/>
+            </a:endParaRPr>
+          </a:p>
+        </p:txBody>
+      </p:sp>
+      <p:pic>
+        <p:nvPicPr>
+          <p:cNvPr id="5" name="Picture 4">
+            <a:extLst>
+              <a:ext uri="{FF2B5EF4-FFF2-40B4-BE49-F238E27FC236}">
+                <a16:creationId xmlns:a16="http://schemas.microsoft.com/office/drawing/2014/main" id="{F2F54396-86E8-4E28-86CF-FB59C68A5375}"/>
+              </a:ext>
+            </a:extLst>
+          </p:cNvPr>
+          <p:cNvPicPr>
+            <a:picLocks noChangeAspect="1"/>
+          </p:cNvPicPr>
+          <p:nvPr/>
+        </p:nvPicPr>
+        <p:blipFill>
+          <a:blip r:embed="rId3"/>
+          <a:stretch>
+            <a:fillRect/>
+          </a:stretch>
+        </p:blipFill>
+        <p:spPr>
+          <a:xfrm>
+            <a:off x="9169293" y="1400650"/>
+            <a:ext cx="2184507" cy="1501848"/>
+          </a:xfrm>
+          <a:prstGeom prst="rect">
+            <a:avLst/>
+          </a:prstGeom>
+        </p:spPr>
+      </p:pic>
+      <p:pic>
+        <p:nvPicPr>
+          <p:cNvPr id="6" name="Picture 5">
+            <a:extLst>
+              <a:ext uri="{FF2B5EF4-FFF2-40B4-BE49-F238E27FC236}">
+                <a16:creationId xmlns:a16="http://schemas.microsoft.com/office/drawing/2014/main" id="{851FB208-4C78-47C1-B88F-EE7BACF7E069}"/>
+              </a:ext>
+            </a:extLst>
+          </p:cNvPr>
+          <p:cNvPicPr>
+            <a:picLocks noChangeAspect="1"/>
+          </p:cNvPicPr>
+          <p:nvPr/>
+        </p:nvPicPr>
+        <p:blipFill>
+          <a:blip r:embed="rId4"/>
+          <a:stretch>
+            <a:fillRect/>
+          </a:stretch>
+        </p:blipFill>
+        <p:spPr>
+          <a:xfrm>
+            <a:off x="470297" y="2517294"/>
+            <a:ext cx="4554286" cy="3767284"/>
+          </a:xfrm>
+          <a:prstGeom prst="rect">
+            <a:avLst/>
+          </a:prstGeom>
+        </p:spPr>
+      </p:pic>
     </p:spTree>
     <p:extLst>
       <p:ext uri="{BB962C8B-B14F-4D97-AF65-F5344CB8AC3E}">
@@ -3811,16 +4574,25 @@
             <p:ph type="title"/>
           </p:nvPr>
         </p:nvSpPr>
-        <p:spPr/>
+        <p:spPr>
+          <a:xfrm>
+            <a:off x="838200" y="365125"/>
+            <a:ext cx="10515600" cy="807893"/>
+          </a:xfrm>
+        </p:spPr>
         <p:txBody>
           <a:bodyPr/>
           <a:lstStyle/>
           <a:p>
             <a:r>
-              <a:rPr lang="en-US" dirty="0"/>
-              <a:t>bootstrap</a:t>
-            </a:r>
-            <a:endParaRPr lang="en-GB" dirty="0"/>
+              <a:rPr lang="en-US" dirty="0">
+                <a:latin typeface="Raleway" panose="020B0503030101060003" pitchFamily="34" charset="0"/>
+              </a:rPr>
+              <a:t>Bootstrap</a:t>
+            </a:r>
+            <a:endParaRPr lang="en-GB" dirty="0">
+              <a:latin typeface="Raleway" panose="020B0503030101060003" pitchFamily="34" charset="0"/>
+            </a:endParaRPr>
           </a:p>
         </p:txBody>
       </p:sp>
@@ -3840,31 +4612,221 @@
             <p:ph idx="1"/>
           </p:nvPr>
         </p:nvSpPr>
-        <p:spPr/>
+        <p:spPr>
+          <a:xfrm>
+            <a:off x="838200" y="1311564"/>
+            <a:ext cx="10515600" cy="4865399"/>
+          </a:xfrm>
+        </p:spPr>
         <p:txBody>
           <a:bodyPr/>
           <a:lstStyle/>
           <a:p>
             <a:r>
-              <a:rPr lang="en-US" dirty="0"/>
-              <a:t>Pros / cons</a:t>
-            </a:r>
-          </a:p>
-          <a:p>
-            <a:r>
-              <a:rPr lang="en-US" dirty="0"/>
-              <a:t>Different options</a:t>
-            </a:r>
-          </a:p>
-          <a:p>
-            <a:r>
-              <a:rPr lang="en-US" dirty="0"/>
-              <a:t>Example output </a:t>
-            </a:r>
-            <a:endParaRPr lang="en-GB" dirty="0"/>
-          </a:p>
-        </p:txBody>
-      </p:sp>
+              <a:rPr lang="en-US" dirty="0">
+                <a:latin typeface="Raleway" panose="020B0503030101060003" pitchFamily="34" charset="0"/>
+              </a:rPr>
+              <a:t>We need to implement some measure of uncertainty!</a:t>
+            </a:r>
+          </a:p>
+          <a:p>
+            <a:r>
+              <a:rPr lang="en-US" dirty="0">
+                <a:latin typeface="Raleway" panose="020B0503030101060003" pitchFamily="34" charset="0"/>
+              </a:rPr>
+              <a:t>Analytical or bootstrap?</a:t>
+            </a:r>
+          </a:p>
+          <a:p>
+            <a:r>
+              <a:rPr lang="en-US" dirty="0">
+                <a:latin typeface="Raleway" panose="020B0503030101060003" pitchFamily="34" charset="0"/>
+              </a:rPr>
+              <a:t>Parametric or non-parametric?</a:t>
+            </a:r>
+          </a:p>
+        </p:txBody>
+      </p:sp>
+      <p:pic>
+        <p:nvPicPr>
+          <p:cNvPr id="4" name="Picture 3">
+            <a:extLst>
+              <a:ext uri="{FF2B5EF4-FFF2-40B4-BE49-F238E27FC236}">
+                <a16:creationId xmlns:a16="http://schemas.microsoft.com/office/drawing/2014/main" id="{25A7B69E-D54A-4728-A9EB-803A173F686D}"/>
+              </a:ext>
+            </a:extLst>
+          </p:cNvPr>
+          <p:cNvPicPr>
+            <a:picLocks noChangeAspect="1"/>
+          </p:cNvPicPr>
+          <p:nvPr/>
+        </p:nvPicPr>
+        <p:blipFill>
+          <a:blip r:embed="rId2"/>
+          <a:stretch>
+            <a:fillRect/>
+          </a:stretch>
+        </p:blipFill>
+        <p:spPr>
+          <a:xfrm>
+            <a:off x="906580" y="3057940"/>
+            <a:ext cx="4031115" cy="273498"/>
+          </a:xfrm>
+          <a:prstGeom prst="rect">
+            <a:avLst/>
+          </a:prstGeom>
+        </p:spPr>
+      </p:pic>
+      <p:pic>
+        <p:nvPicPr>
+          <p:cNvPr id="7" name="Picture 6">
+            <a:extLst>
+              <a:ext uri="{FF2B5EF4-FFF2-40B4-BE49-F238E27FC236}">
+                <a16:creationId xmlns:a16="http://schemas.microsoft.com/office/drawing/2014/main" id="{E035F01F-6002-4BE6-B688-F4EC2FE8AF8B}"/>
+              </a:ext>
+            </a:extLst>
+          </p:cNvPr>
+          <p:cNvPicPr>
+            <a:picLocks noChangeAspect="1"/>
+          </p:cNvPicPr>
+          <p:nvPr/>
+        </p:nvPicPr>
+        <p:blipFill>
+          <a:blip r:embed="rId3"/>
+          <a:stretch>
+            <a:fillRect/>
+          </a:stretch>
+        </p:blipFill>
+        <p:spPr>
+          <a:xfrm>
+            <a:off x="910166" y="3604614"/>
+            <a:ext cx="1934956" cy="468622"/>
+          </a:xfrm>
+          <a:prstGeom prst="rect">
+            <a:avLst/>
+          </a:prstGeom>
+        </p:spPr>
+      </p:pic>
+      <p:pic>
+        <p:nvPicPr>
+          <p:cNvPr id="9" name="Picture 8">
+            <a:extLst>
+              <a:ext uri="{FF2B5EF4-FFF2-40B4-BE49-F238E27FC236}">
+                <a16:creationId xmlns:a16="http://schemas.microsoft.com/office/drawing/2014/main" id="{09C9CC2C-3DAF-4F79-A6CD-33EE681F60B9}"/>
+              </a:ext>
+            </a:extLst>
+          </p:cNvPr>
+          <p:cNvPicPr>
+            <a:picLocks noChangeAspect="1"/>
+          </p:cNvPicPr>
+          <p:nvPr/>
+        </p:nvPicPr>
+        <p:blipFill>
+          <a:blip r:embed="rId4"/>
+          <a:stretch>
+            <a:fillRect/>
+          </a:stretch>
+        </p:blipFill>
+        <p:spPr>
+          <a:xfrm>
+            <a:off x="1017649" y="4371531"/>
+            <a:ext cx="1405864" cy="468622"/>
+          </a:xfrm>
+          <a:prstGeom prst="rect">
+            <a:avLst/>
+          </a:prstGeom>
+        </p:spPr>
+      </p:pic>
+      <p:pic>
+        <p:nvPicPr>
+          <p:cNvPr id="10" name="Picture 9">
+            <a:extLst>
+              <a:ext uri="{FF2B5EF4-FFF2-40B4-BE49-F238E27FC236}">
+                <a16:creationId xmlns:a16="http://schemas.microsoft.com/office/drawing/2014/main" id="{32797063-CDAB-4998-B16B-9E29FE19473A}"/>
+              </a:ext>
+            </a:extLst>
+          </p:cNvPr>
+          <p:cNvPicPr>
+            <a:picLocks noChangeAspect="1"/>
+          </p:cNvPicPr>
+          <p:nvPr/>
+        </p:nvPicPr>
+        <p:blipFill>
+          <a:blip r:embed="rId5"/>
+          <a:stretch>
+            <a:fillRect/>
+          </a:stretch>
+        </p:blipFill>
+        <p:spPr>
+          <a:xfrm>
+            <a:off x="3140092" y="3604614"/>
+            <a:ext cx="1952591" cy="468622"/>
+          </a:xfrm>
+          <a:prstGeom prst="rect">
+            <a:avLst/>
+          </a:prstGeom>
+        </p:spPr>
+      </p:pic>
+      <p:pic>
+        <p:nvPicPr>
+          <p:cNvPr id="11" name="Picture 10">
+            <a:extLst>
+              <a:ext uri="{FF2B5EF4-FFF2-40B4-BE49-F238E27FC236}">
+                <a16:creationId xmlns:a16="http://schemas.microsoft.com/office/drawing/2014/main" id="{EF121B91-5245-44D1-AF5A-CEC7D45225AD}"/>
+              </a:ext>
+            </a:extLst>
+          </p:cNvPr>
+          <p:cNvPicPr>
+            <a:picLocks noChangeAspect="1"/>
+          </p:cNvPicPr>
+          <p:nvPr/>
+        </p:nvPicPr>
+        <p:blipFill>
+          <a:blip r:embed="rId6"/>
+          <a:stretch>
+            <a:fillRect/>
+          </a:stretch>
+        </p:blipFill>
+        <p:spPr>
+          <a:xfrm>
+            <a:off x="6297639" y="2089788"/>
+            <a:ext cx="5322455" cy="4498054"/>
+          </a:xfrm>
+          <a:prstGeom prst="rect">
+            <a:avLst/>
+          </a:prstGeom>
+        </p:spPr>
+      </p:pic>
+      <p:pic>
+        <p:nvPicPr>
+          <p:cNvPr id="12" name="Picture 11">
+            <a:extLst>
+              <a:ext uri="{FF2B5EF4-FFF2-40B4-BE49-F238E27FC236}">
+                <a16:creationId xmlns:a16="http://schemas.microsoft.com/office/drawing/2014/main" id="{9C21D76D-480D-4F90-B490-0D1B99D9FF93}"/>
+              </a:ext>
+            </a:extLst>
+          </p:cNvPr>
+          <p:cNvPicPr>
+            <a:picLocks noChangeAspect="1"/>
+          </p:cNvPicPr>
+          <p:nvPr/>
+        </p:nvPicPr>
+        <p:blipFill>
+          <a:blip r:embed="rId7"/>
+          <a:stretch>
+            <a:fillRect/>
+          </a:stretch>
+        </p:blipFill>
+        <p:spPr>
+          <a:xfrm>
+            <a:off x="3140092" y="4346412"/>
+            <a:ext cx="1936970" cy="468622"/>
+          </a:xfrm>
+          <a:prstGeom prst="rect">
+            <a:avLst/>
+          </a:prstGeom>
+        </p:spPr>
+      </p:pic>
     </p:spTree>
     <p:extLst>
       <p:ext uri="{BB962C8B-B14F-4D97-AF65-F5344CB8AC3E}">
@@ -4079,12 +5041,25 @@
             <p:ph type="title"/>
           </p:nvPr>
         </p:nvSpPr>
-        <p:spPr/>
+        <p:spPr>
+          <a:xfrm>
+            <a:off x="838200" y="365126"/>
+            <a:ext cx="10515600" cy="826366"/>
+          </a:xfrm>
+        </p:spPr>
         <p:txBody>
           <a:bodyPr/>
           <a:lstStyle/>
           <a:p>
-            <a:endParaRPr lang="en-GB"/>
+            <a:r>
+              <a:rPr lang="en-US" dirty="0">
+                <a:latin typeface="Raleway" panose="020B0503030101060003" pitchFamily="34" charset="0"/>
+              </a:rPr>
+              <a:t>Conclusion</a:t>
+            </a:r>
+            <a:endParaRPr lang="en-GB" dirty="0">
+              <a:latin typeface="Raleway" panose="020B0503030101060003" pitchFamily="34" charset="0"/>
+            </a:endParaRPr>
           </a:p>
         </p:txBody>
       </p:sp>
@@ -4104,12 +5079,17 @@
             <p:ph idx="1"/>
           </p:nvPr>
         </p:nvSpPr>
-        <p:spPr/>
+        <p:spPr>
+          <a:xfrm>
+            <a:off x="838200" y="1330036"/>
+            <a:ext cx="10515600" cy="4846927"/>
+          </a:xfrm>
+        </p:spPr>
         <p:txBody>
           <a:bodyPr/>
           <a:lstStyle/>
           <a:p>
-            <a:endParaRPr lang="en-GB"/>
+            <a:endParaRPr lang="en-GB" dirty="0"/>
           </a:p>
         </p:txBody>
       </p:sp>
@@ -4117,86 +5097,6 @@
     <p:extLst>
       <p:ext uri="{BB962C8B-B14F-4D97-AF65-F5344CB8AC3E}">
         <p14:creationId xmlns:p14="http://schemas.microsoft.com/office/powerpoint/2010/main" val="3917298598"/>
-      </p:ext>
-    </p:extLst>
-  </p:cSld>
-  <p:clrMapOvr>
-    <a:masterClrMapping/>
-  </p:clrMapOvr>
-</p:sld>
-</file>
-
-<file path=ppt/slides/slide17.xml><?xml version="1.0" encoding="utf-8"?>
-<p:sld xmlns:a="http://schemas.openxmlformats.org/drawingml/2006/main" xmlns:r="http://schemas.openxmlformats.org/officeDocument/2006/relationships" xmlns:p="http://schemas.openxmlformats.org/presentationml/2006/main">
-  <p:cSld>
-    <p:spTree>
-      <p:nvGrpSpPr>
-        <p:cNvPr id="1" name=""/>
-        <p:cNvGrpSpPr/>
-        <p:nvPr/>
-      </p:nvGrpSpPr>
-      <p:grpSpPr>
-        <a:xfrm>
-          <a:off x="0" y="0"/>
-          <a:ext cx="0" cy="0"/>
-          <a:chOff x="0" y="0"/>
-          <a:chExt cx="0" cy="0"/>
-        </a:xfrm>
-      </p:grpSpPr>
-      <p:sp>
-        <p:nvSpPr>
-          <p:cNvPr id="2" name="Title 1">
-            <a:extLst>
-              <a:ext uri="{FF2B5EF4-FFF2-40B4-BE49-F238E27FC236}">
-                <a16:creationId xmlns:a16="http://schemas.microsoft.com/office/drawing/2014/main" id="{6BFAE822-325D-48F0-B7E2-188E0A40A66F}"/>
-              </a:ext>
-            </a:extLst>
-          </p:cNvPr>
-          <p:cNvSpPr>
-            <a:spLocks noGrp="1"/>
-          </p:cNvSpPr>
-          <p:nvPr>
-            <p:ph type="title"/>
-          </p:nvPr>
-        </p:nvSpPr>
-        <p:spPr/>
-        <p:txBody>
-          <a:bodyPr/>
-          <a:lstStyle/>
-          <a:p>
-            <a:endParaRPr lang="en-GB"/>
-          </a:p>
-        </p:txBody>
-      </p:sp>
-      <p:sp>
-        <p:nvSpPr>
-          <p:cNvPr id="3" name="Content Placeholder 2">
-            <a:extLst>
-              <a:ext uri="{FF2B5EF4-FFF2-40B4-BE49-F238E27FC236}">
-                <a16:creationId xmlns:a16="http://schemas.microsoft.com/office/drawing/2014/main" id="{E0678932-FB34-465A-AFCF-25C4F857D190}"/>
-              </a:ext>
-            </a:extLst>
-          </p:cNvPr>
-          <p:cNvSpPr>
-            <a:spLocks noGrp="1"/>
-          </p:cNvSpPr>
-          <p:nvPr>
-            <p:ph idx="1"/>
-          </p:nvPr>
-        </p:nvSpPr>
-        <p:spPr/>
-        <p:txBody>
-          <a:bodyPr/>
-          <a:lstStyle/>
-          <a:p>
-            <a:endParaRPr lang="en-GB"/>
-          </a:p>
-        </p:txBody>
-      </p:sp>
-    </p:spTree>
-    <p:extLst>
-      <p:ext uri="{BB962C8B-B14F-4D97-AF65-F5344CB8AC3E}">
-        <p14:creationId xmlns:p14="http://schemas.microsoft.com/office/powerpoint/2010/main" val="1627957045"/>
       </p:ext>
     </p:extLst>
   </p:cSld>
@@ -5713,10 +6613,10 @@
       </p:sp>
       <p:sp>
         <p:nvSpPr>
-          <p:cNvPr id="3" name="Content Placeholder 2">
-            <a:extLst>
-              <a:ext uri="{FF2B5EF4-FFF2-40B4-BE49-F238E27FC236}">
-                <a16:creationId xmlns:a16="http://schemas.microsoft.com/office/drawing/2014/main" id="{84299848-DFA0-40BC-94E9-0744EA3BF58B}"/>
+          <p:cNvPr id="6" name="Content Placeholder 5">
+            <a:extLst>
+              <a:ext uri="{FF2B5EF4-FFF2-40B4-BE49-F238E27FC236}">
+                <a16:creationId xmlns:a16="http://schemas.microsoft.com/office/drawing/2014/main" id="{22123084-8168-4CBA-AD95-FAD3FADA9986}"/>
               </a:ext>
             </a:extLst>
           </p:cNvPr>
@@ -5727,20 +6627,75 @@
             <p:ph idx="1"/>
           </p:nvPr>
         </p:nvSpPr>
-        <p:spPr>
-          <a:xfrm>
-            <a:off x="838200" y="1206500"/>
-            <a:ext cx="10515600" cy="4970463"/>
-          </a:xfrm>
-        </p:spPr>
+        <p:spPr/>
         <p:txBody>
           <a:bodyPr/>
           <a:lstStyle/>
           <a:p>
-            <a:endParaRPr lang="en-GB" dirty="0"/>
-          </a:p>
-        </p:txBody>
-      </p:sp>
+            <a:endParaRPr lang="en-GB"/>
+          </a:p>
+        </p:txBody>
+      </p:sp>
+      <p:pic>
+        <p:nvPicPr>
+          <p:cNvPr id="7" name="Picture 6">
+            <a:extLst>
+              <a:ext uri="{FF2B5EF4-FFF2-40B4-BE49-F238E27FC236}">
+                <a16:creationId xmlns:a16="http://schemas.microsoft.com/office/drawing/2014/main" id="{E56799E7-7547-4FE0-A553-783F959D4015}"/>
+              </a:ext>
+            </a:extLst>
+          </p:cNvPr>
+          <p:cNvPicPr>
+            <a:picLocks noChangeAspect="1"/>
+          </p:cNvPicPr>
+          <p:nvPr/>
+        </p:nvPicPr>
+        <p:blipFill>
+          <a:blip r:embed="rId2"/>
+          <a:stretch>
+            <a:fillRect/>
+          </a:stretch>
+        </p:blipFill>
+        <p:spPr>
+          <a:xfrm>
+            <a:off x="552282" y="1577565"/>
+            <a:ext cx="5312941" cy="4847457"/>
+          </a:xfrm>
+          <a:prstGeom prst="rect">
+            <a:avLst/>
+          </a:prstGeom>
+        </p:spPr>
+      </p:pic>
+      <p:pic>
+        <p:nvPicPr>
+          <p:cNvPr id="8" name="Picture 7">
+            <a:extLst>
+              <a:ext uri="{FF2B5EF4-FFF2-40B4-BE49-F238E27FC236}">
+                <a16:creationId xmlns:a16="http://schemas.microsoft.com/office/drawing/2014/main" id="{3C9D985B-B893-48E9-96AD-D30A99B80291}"/>
+              </a:ext>
+            </a:extLst>
+          </p:cNvPr>
+          <p:cNvPicPr>
+            <a:picLocks noChangeAspect="1"/>
+          </p:cNvPicPr>
+          <p:nvPr/>
+        </p:nvPicPr>
+        <p:blipFill>
+          <a:blip r:embed="rId3"/>
+          <a:stretch>
+            <a:fillRect/>
+          </a:stretch>
+        </p:blipFill>
+        <p:spPr>
+          <a:xfrm>
+            <a:off x="6096000" y="1408839"/>
+            <a:ext cx="5257800" cy="4960849"/>
+          </a:xfrm>
+          <a:prstGeom prst="rect">
+            <a:avLst/>
+          </a:prstGeom>
+        </p:spPr>
+      </p:pic>
     </p:spTree>
     <p:extLst>
       <p:ext uri="{BB962C8B-B14F-4D97-AF65-F5344CB8AC3E}">
@@ -5787,16 +6742,25 @@
             <p:ph type="title"/>
           </p:nvPr>
         </p:nvSpPr>
-        <p:spPr/>
+        <p:spPr>
+          <a:xfrm>
+            <a:off x="838200" y="365126"/>
+            <a:ext cx="10515600" cy="742222"/>
+          </a:xfrm>
+        </p:spPr>
         <p:txBody>
           <a:bodyPr/>
           <a:lstStyle/>
           <a:p>
             <a:r>
-              <a:rPr lang="en-US" dirty="0"/>
+              <a:rPr lang="en-US" dirty="0">
+                <a:latin typeface="Raleway" panose="020B0503030101060003" pitchFamily="34" charset="0"/>
+              </a:rPr>
               <a:t>Covariate inclusion</a:t>
             </a:r>
-            <a:endParaRPr lang="en-GB" dirty="0"/>
+            <a:endParaRPr lang="en-GB" dirty="0">
+              <a:latin typeface="Raleway" panose="020B0503030101060003" pitchFamily="34" charset="0"/>
+            </a:endParaRPr>
           </a:p>
         </p:txBody>
       </p:sp>
@@ -5816,15 +6780,401 @@
             <p:ph idx="1"/>
           </p:nvPr>
         </p:nvSpPr>
-        <p:spPr/>
+        <p:spPr>
+          <a:xfrm>
+            <a:off x="838200" y="1266738"/>
+            <a:ext cx="10515600" cy="4910225"/>
+          </a:xfrm>
+        </p:spPr>
         <p:txBody>
           <a:bodyPr/>
           <a:lstStyle/>
           <a:p>
-            <a:endParaRPr lang="en-GB"/>
-          </a:p>
-        </p:txBody>
-      </p:sp>
+            <a:r>
+              <a:rPr lang="en-US" dirty="0">
+                <a:latin typeface="Raleway" panose="020B0503030101060003" pitchFamily="34" charset="0"/>
+              </a:rPr>
+              <a:t>Those formulas look nasty… Where on earth do we include covariates?</a:t>
+            </a:r>
+            <a:endParaRPr lang="en-GB" dirty="0">
+              <a:latin typeface="Raleway" panose="020B0503030101060003" pitchFamily="34" charset="0"/>
+            </a:endParaRPr>
+          </a:p>
+        </p:txBody>
+      </p:sp>
+      <p:pic>
+        <p:nvPicPr>
+          <p:cNvPr id="5" name="Picture 4">
+            <a:extLst>
+              <a:ext uri="{FF2B5EF4-FFF2-40B4-BE49-F238E27FC236}">
+                <a16:creationId xmlns:a16="http://schemas.microsoft.com/office/drawing/2014/main" id="{4025EE50-DEA5-479E-91A5-3D115C870B3E}"/>
+              </a:ext>
+            </a:extLst>
+          </p:cNvPr>
+          <p:cNvPicPr>
+            <a:picLocks noChangeAspect="1"/>
+          </p:cNvPicPr>
+          <p:nvPr/>
+        </p:nvPicPr>
+        <p:blipFill>
+          <a:blip r:embed="rId2"/>
+          <a:stretch>
+            <a:fillRect/>
+          </a:stretch>
+        </p:blipFill>
+        <p:spPr>
+          <a:xfrm>
+            <a:off x="1087582" y="2447636"/>
+            <a:ext cx="4692701" cy="727594"/>
+          </a:xfrm>
+          <a:prstGeom prst="rect">
+            <a:avLst/>
+          </a:prstGeom>
+        </p:spPr>
+      </p:pic>
+      <p:pic>
+        <p:nvPicPr>
+          <p:cNvPr id="6" name="Picture 5">
+            <a:extLst>
+              <a:ext uri="{FF2B5EF4-FFF2-40B4-BE49-F238E27FC236}">
+                <a16:creationId xmlns:a16="http://schemas.microsoft.com/office/drawing/2014/main" id="{838F478A-2D05-48C1-AC96-6AF4E3366942}"/>
+              </a:ext>
+            </a:extLst>
+          </p:cNvPr>
+          <p:cNvPicPr>
+            <a:picLocks noChangeAspect="1"/>
+          </p:cNvPicPr>
+          <p:nvPr/>
+        </p:nvPicPr>
+        <p:blipFill>
+          <a:blip r:embed="rId3"/>
+          <a:stretch>
+            <a:fillRect/>
+          </a:stretch>
+        </p:blipFill>
+        <p:spPr>
+          <a:xfrm>
+            <a:off x="1013691" y="3429000"/>
+            <a:ext cx="5674311" cy="2715273"/>
+          </a:xfrm>
+          <a:prstGeom prst="rect">
+            <a:avLst/>
+          </a:prstGeom>
+        </p:spPr>
+      </p:pic>
+      <mc:AlternateContent xmlns:mc="http://schemas.openxmlformats.org/markup-compatibility/2006">
+        <mc:Choice xmlns:p14="http://schemas.microsoft.com/office/powerpoint/2010/main" Requires="p14">
+          <p:contentPart p14:bwMode="auto" r:id="rId4">
+            <p14:nvContentPartPr>
+              <p14:cNvPr id="47" name="Ink 46">
+                <a:extLst>
+                  <a:ext uri="{FF2B5EF4-FFF2-40B4-BE49-F238E27FC236}">
+                    <a16:creationId xmlns:a16="http://schemas.microsoft.com/office/drawing/2014/main" id="{EBF12745-FDAE-4344-B9A3-7B4623476B22}"/>
+                  </a:ext>
+                </a:extLst>
+              </p14:cNvPr>
+              <p14:cNvContentPartPr/>
+              <p14:nvPr/>
+            </p14:nvContentPartPr>
+            <p14:xfrm>
+              <a:off x="4021950" y="4012289"/>
+              <a:ext cx="4069800" cy="650520"/>
+            </p14:xfrm>
+          </p:contentPart>
+        </mc:Choice>
+        <mc:Fallback>
+          <p:pic>
+            <p:nvPicPr>
+              <p:cNvPr id="47" name="Ink 46">
+                <a:extLst>
+                  <a:ext uri="{FF2B5EF4-FFF2-40B4-BE49-F238E27FC236}">
+                    <a16:creationId xmlns:a16="http://schemas.microsoft.com/office/drawing/2014/main" id="{EBF12745-FDAE-4344-B9A3-7B4623476B22}"/>
+                  </a:ext>
+                </a:extLst>
+              </p:cNvPr>
+              <p:cNvPicPr/>
+              <p:nvPr/>
+            </p:nvPicPr>
+            <p:blipFill>
+              <a:blip r:embed="rId5"/>
+              <a:stretch>
+                <a:fillRect/>
+              </a:stretch>
+            </p:blipFill>
+            <p:spPr>
+              <a:xfrm>
+                <a:off x="4013310" y="4003654"/>
+                <a:ext cx="4087440" cy="668150"/>
+              </a:xfrm>
+              <a:prstGeom prst="rect">
+                <a:avLst/>
+              </a:prstGeom>
+            </p:spPr>
+          </p:pic>
+        </mc:Fallback>
+      </mc:AlternateContent>
+      <mc:AlternateContent xmlns:mc="http://schemas.openxmlformats.org/markup-compatibility/2006">
+        <mc:Choice xmlns:p14="http://schemas.microsoft.com/office/powerpoint/2010/main" Requires="p14">
+          <p:contentPart p14:bwMode="auto" r:id="rId6">
+            <p14:nvContentPartPr>
+              <p14:cNvPr id="51" name="Ink 50">
+                <a:extLst>
+                  <a:ext uri="{FF2B5EF4-FFF2-40B4-BE49-F238E27FC236}">
+                    <a16:creationId xmlns:a16="http://schemas.microsoft.com/office/drawing/2014/main" id="{60719472-85C9-4EC0-A19F-436E237ACC09}"/>
+                  </a:ext>
+                </a:extLst>
+              </p14:cNvPr>
+              <p14:cNvContentPartPr/>
+              <p14:nvPr/>
+            </p14:nvContentPartPr>
+            <p14:xfrm>
+              <a:off x="3249030" y="2187089"/>
+              <a:ext cx="3873240" cy="878040"/>
+            </p14:xfrm>
+          </p:contentPart>
+        </mc:Choice>
+        <mc:Fallback>
+          <p:pic>
+            <p:nvPicPr>
+              <p:cNvPr id="51" name="Ink 50">
+                <a:extLst>
+                  <a:ext uri="{FF2B5EF4-FFF2-40B4-BE49-F238E27FC236}">
+                    <a16:creationId xmlns:a16="http://schemas.microsoft.com/office/drawing/2014/main" id="{60719472-85C9-4EC0-A19F-436E237ACC09}"/>
+                  </a:ext>
+                </a:extLst>
+              </p:cNvPr>
+              <p:cNvPicPr/>
+              <p:nvPr/>
+            </p:nvPicPr>
+            <p:blipFill>
+              <a:blip r:embed="rId7"/>
+              <a:stretch>
+                <a:fillRect/>
+              </a:stretch>
+            </p:blipFill>
+            <p:spPr>
+              <a:xfrm>
+                <a:off x="3240390" y="2178449"/>
+                <a:ext cx="3890880" cy="895680"/>
+              </a:xfrm>
+              <a:prstGeom prst="rect">
+                <a:avLst/>
+              </a:prstGeom>
+            </p:spPr>
+          </p:pic>
+        </mc:Fallback>
+      </mc:AlternateContent>
+      <p:sp>
+        <p:nvSpPr>
+          <p:cNvPr id="63" name="TextBox 62">
+            <a:extLst>
+              <a:ext uri="{FF2B5EF4-FFF2-40B4-BE49-F238E27FC236}">
+                <a16:creationId xmlns:a16="http://schemas.microsoft.com/office/drawing/2014/main" id="{F24087ED-93E4-4F82-A1B1-4B71AB184A5D}"/>
+              </a:ext>
+            </a:extLst>
+          </p:cNvPr>
+          <p:cNvSpPr txBox="1"/>
+          <p:nvPr/>
+        </p:nvSpPr>
+        <p:spPr>
+          <a:xfrm>
+            <a:off x="7256477" y="2273417"/>
+            <a:ext cx="3171039" cy="923330"/>
+          </a:xfrm>
+          <a:prstGeom prst="rect">
+            <a:avLst/>
+          </a:prstGeom>
+          <a:noFill/>
+        </p:spPr>
+        <p:txBody>
+          <a:bodyPr wrap="square" rtlCol="0">
+            <a:spAutoFit/>
+          </a:bodyPr>
+          <a:lstStyle/>
+          <a:p>
+            <a:r>
+              <a:rPr lang="en-US" dirty="0">
+                <a:latin typeface="Raleway" panose="020B0503030101060003" pitchFamily="34" charset="0"/>
+              </a:rPr>
+              <a:t>Affects the whole function, so can be seen as an intercept</a:t>
+            </a:r>
+            <a:endParaRPr lang="en-GB" dirty="0">
+              <a:latin typeface="Raleway" panose="020B0503030101060003" pitchFamily="34" charset="0"/>
+            </a:endParaRPr>
+          </a:p>
+        </p:txBody>
+      </p:sp>
+      <p:sp>
+        <p:nvSpPr>
+          <p:cNvPr id="64" name="TextBox 63">
+            <a:extLst>
+              <a:ext uri="{FF2B5EF4-FFF2-40B4-BE49-F238E27FC236}">
+                <a16:creationId xmlns:a16="http://schemas.microsoft.com/office/drawing/2014/main" id="{58381D99-1407-484E-8C7E-01C7CA8CB341}"/>
+              </a:ext>
+            </a:extLst>
+          </p:cNvPr>
+          <p:cNvSpPr txBox="1"/>
+          <p:nvPr/>
+        </p:nvSpPr>
+        <p:spPr>
+          <a:xfrm>
+            <a:off x="8322973" y="4202492"/>
+            <a:ext cx="3171038" cy="923330"/>
+          </a:xfrm>
+          <a:prstGeom prst="rect">
+            <a:avLst/>
+          </a:prstGeom>
+          <a:noFill/>
+        </p:spPr>
+        <p:txBody>
+          <a:bodyPr wrap="square" rtlCol="0">
+            <a:spAutoFit/>
+          </a:bodyPr>
+          <a:lstStyle/>
+          <a:p>
+            <a:r>
+              <a:rPr lang="en-US" dirty="0">
+                <a:latin typeface="Raleway" panose="020B0503030101060003" pitchFamily="34" charset="0"/>
+              </a:rPr>
+              <a:t>Scale parameter which affects both the x and y in the same way</a:t>
+            </a:r>
+            <a:endParaRPr lang="en-GB" dirty="0">
+              <a:latin typeface="Raleway" panose="020B0503030101060003" pitchFamily="34" charset="0"/>
+            </a:endParaRPr>
+          </a:p>
+        </p:txBody>
+      </p:sp>
+      <p:sp>
+        <p:nvSpPr>
+          <p:cNvPr id="65" name="TextBox 64">
+            <a:extLst>
+              <a:ext uri="{FF2B5EF4-FFF2-40B4-BE49-F238E27FC236}">
+                <a16:creationId xmlns:a16="http://schemas.microsoft.com/office/drawing/2014/main" id="{1446E2D0-7EC1-40B2-B60F-E958B58A99B6}"/>
+              </a:ext>
+            </a:extLst>
+          </p:cNvPr>
+          <p:cNvSpPr txBox="1"/>
+          <p:nvPr/>
+        </p:nvSpPr>
+        <p:spPr>
+          <a:xfrm>
+            <a:off x="7256477" y="5406596"/>
+            <a:ext cx="4123218" cy="369332"/>
+          </a:xfrm>
+          <a:prstGeom prst="rect">
+            <a:avLst/>
+          </a:prstGeom>
+          <a:noFill/>
+        </p:spPr>
+        <p:txBody>
+          <a:bodyPr wrap="square" rtlCol="0">
+            <a:spAutoFit/>
+          </a:bodyPr>
+          <a:lstStyle/>
+          <a:p>
+            <a:r>
+              <a:rPr lang="en-US" dirty="0">
+                <a:latin typeface="Raleway" panose="020B0503030101060003" pitchFamily="34" charset="0"/>
+              </a:rPr>
+              <a:t>Scale parameter affecting only the y</a:t>
+            </a:r>
+            <a:endParaRPr lang="en-GB" dirty="0">
+              <a:latin typeface="Raleway" panose="020B0503030101060003" pitchFamily="34" charset="0"/>
+            </a:endParaRPr>
+          </a:p>
+        </p:txBody>
+      </p:sp>
+      <p:sp>
+        <p:nvSpPr>
+          <p:cNvPr id="70" name="TextBox 69">
+            <a:extLst>
+              <a:ext uri="{FF2B5EF4-FFF2-40B4-BE49-F238E27FC236}">
+                <a16:creationId xmlns:a16="http://schemas.microsoft.com/office/drawing/2014/main" id="{336FB7AB-9647-46DA-838A-ACA5323C26D6}"/>
+              </a:ext>
+            </a:extLst>
+          </p:cNvPr>
+          <p:cNvSpPr txBox="1"/>
+          <p:nvPr/>
+        </p:nvSpPr>
+        <p:spPr>
+          <a:xfrm>
+            <a:off x="10014738" y="5896892"/>
+            <a:ext cx="1963024" cy="923330"/>
+          </a:xfrm>
+          <a:prstGeom prst="rect">
+            <a:avLst/>
+          </a:prstGeom>
+          <a:noFill/>
+        </p:spPr>
+        <p:txBody>
+          <a:bodyPr wrap="square" rtlCol="0">
+            <a:spAutoFit/>
+          </a:bodyPr>
+          <a:lstStyle/>
+          <a:p>
+            <a:r>
+              <a:rPr lang="en-US" dirty="0">
+                <a:latin typeface="Raleway" panose="020B0503030101060003" pitchFamily="34" charset="0"/>
+              </a:rPr>
+              <a:t>Scale parameter affecting only the x</a:t>
+            </a:r>
+            <a:endParaRPr lang="en-GB" dirty="0">
+              <a:latin typeface="Raleway" panose="020B0503030101060003" pitchFamily="34" charset="0"/>
+            </a:endParaRPr>
+          </a:p>
+        </p:txBody>
+      </p:sp>
+      <mc:AlternateContent xmlns:mc="http://schemas.openxmlformats.org/markup-compatibility/2006">
+        <mc:Choice xmlns:p14="http://schemas.microsoft.com/office/powerpoint/2010/main" Requires="p14">
+          <p:contentPart p14:bwMode="auto" r:id="rId8">
+            <p14:nvContentPartPr>
+              <p14:cNvPr id="83" name="Ink 82">
+                <a:extLst>
+                  <a:ext uri="{FF2B5EF4-FFF2-40B4-BE49-F238E27FC236}">
+                    <a16:creationId xmlns:a16="http://schemas.microsoft.com/office/drawing/2014/main" id="{510FA538-98BA-432F-9616-65E5C31D7F25}"/>
+                  </a:ext>
+                </a:extLst>
+              </p14:cNvPr>
+              <p14:cNvContentPartPr/>
+              <p14:nvPr/>
+            </p14:nvContentPartPr>
+            <p14:xfrm>
+              <a:off x="4054710" y="5577569"/>
+              <a:ext cx="5844240" cy="959760"/>
+            </p14:xfrm>
+          </p:contentPart>
+        </mc:Choice>
+        <mc:Fallback>
+          <p:pic>
+            <p:nvPicPr>
+              <p:cNvPr id="83" name="Ink 82">
+                <a:extLst>
+                  <a:ext uri="{FF2B5EF4-FFF2-40B4-BE49-F238E27FC236}">
+                    <a16:creationId xmlns:a16="http://schemas.microsoft.com/office/drawing/2014/main" id="{510FA538-98BA-432F-9616-65E5C31D7F25}"/>
+                  </a:ext>
+                </a:extLst>
+              </p:cNvPr>
+              <p:cNvPicPr/>
+              <p:nvPr/>
+            </p:nvPicPr>
+            <p:blipFill>
+              <a:blip r:embed="rId9"/>
+              <a:stretch>
+                <a:fillRect/>
+              </a:stretch>
+            </p:blipFill>
+            <p:spPr>
+              <a:xfrm>
+                <a:off x="4046070" y="5568569"/>
+                <a:ext cx="5861880" cy="977400"/>
+              </a:xfrm>
+              <a:prstGeom prst="rect">
+                <a:avLst/>
+              </a:prstGeom>
+            </p:spPr>
+          </p:pic>
+        </mc:Fallback>
+      </mc:AlternateContent>
     </p:spTree>
     <p:extLst>
       <p:ext uri="{BB962C8B-B14F-4D97-AF65-F5344CB8AC3E}">

</xml_diff>